<commit_message>
Speaker notes are added in the slides
</commit_message>
<xml_diff>
--- a/Analysis of Education and Socioeconomic Status.pptx
+++ b/Analysis of Education and Socioeconomic Status.pptx
@@ -119,6 +119,11 @@
       </a:defRPr>
     </a:lvl9pPr>
   </p:defaultTextStyle>
+  <p:extLst>
+    <p:ext uri="{EFAFB233-063F-42B5-8137-9DF3F51BA10A}">
+      <p15:sldGuideLst xmlns:p15="http://schemas.microsoft.com/office/powerpoint/2012/main"/>
+    </p:ext>
+  </p:extLst>
 </p:presentation>
 </file>
 
@@ -970,7 +975,7 @@
         <a:lstStyle/>
         <a:p>
           <a:r>
-            <a:rPr lang="en-US"/>
+            <a:rPr lang="en-US" dirty="0"/>
             <a:t>Perform the exploratory data analysis (EDA).</a:t>
           </a:r>
         </a:p>
@@ -1051,7 +1056,7 @@
         <a:p>
           <a:r>
             <a:rPr lang="en-US" dirty="0"/>
-            <a:t>Design a relational database to import in PostgreSQL.</a:t>
+            <a:t>Design a relational database to import tables in PostgreSQL.</a:t>
           </a:r>
         </a:p>
       </dgm:t>
@@ -1329,7 +1334,7 @@
   <dgm:whole/>
   <dgm:extLst>
     <a:ext uri="http://schemas.microsoft.com/office/drawing/2008/diagram">
-      <dsp:dataModelExt xmlns:dsp="http://schemas.microsoft.com/office/drawing/2008/diagram" relId="rId6" minVer="http://schemas.openxmlformats.org/drawingml/2006/diagram"/>
+      <dsp:dataModelExt xmlns:dsp="http://schemas.microsoft.com/office/drawing/2008/diagram" relId="rId7" minVer="http://schemas.openxmlformats.org/drawingml/2006/diagram"/>
     </a:ext>
   </dgm:extLst>
 </dgm:dataModel>
@@ -1479,7 +1484,7 @@
             <a:buNone/>
           </a:pPr>
           <a:r>
-            <a:rPr lang="en-US" sz="1600" kern="1200"/>
+            <a:rPr lang="en-US" sz="1600" kern="1200" dirty="0"/>
             <a:t>Perform the exploratory data analysis (EDA).</a:t>
           </a:r>
         </a:p>
@@ -1626,7 +1631,7 @@
           </a:pPr>
           <a:r>
             <a:rPr lang="en-US" sz="1600" kern="1200" dirty="0"/>
-            <a:t>Design a relational database to import in PostgreSQL.</a:t>
+            <a:t>Design a relational database to import tables in PostgreSQL.</a:t>
           </a:r>
         </a:p>
       </dsp:txBody>
@@ -3141,7 +3146,7 @@
           <a:p>
             <a:fld id="{4FD92C36-925F-4835-9C0F-AF6483863590}" type="datetimeFigureOut">
               <a:rPr lang="en-US" smtClean="0"/>
-              <a:t>5/15/2022</a:t>
+              <a:t>5/16/2022</a:t>
             </a:fld>
             <a:endParaRPr lang="en-US"/>
           </a:p>
@@ -3454,7 +3459,64 @@
           <a:p>
             <a:r>
               <a:rPr lang="en-US" dirty="0"/>
-              <a:t>Using </a:t>
+              <a:t>Here </a:t>
+            </a:r>
+            <a:r>
+              <a:rPr lang="en-US" b="0" i="0" dirty="0" err="1">
+                <a:solidFill>
+                  <a:srgbClr val="202124"/>
+                </a:solidFill>
+                <a:effectLst/>
+                <a:latin typeface="Google Sans"/>
+              </a:rPr>
+              <a:t>tidycensus</a:t>
+            </a:r>
+            <a:r>
+              <a:rPr lang="en-US" b="0" i="0" dirty="0">
+                <a:solidFill>
+                  <a:srgbClr val="202124"/>
+                </a:solidFill>
+                <a:effectLst/>
+                <a:latin typeface="Google Sans"/>
+              </a:rPr>
+              <a:t> library </a:t>
+            </a:r>
+            <a:r>
+              <a:rPr lang="en-US" b="1" i="0" dirty="0">
+                <a:solidFill>
+                  <a:srgbClr val="202124"/>
+                </a:solidFill>
+                <a:effectLst/>
+                <a:latin typeface="Google Sans"/>
+              </a:rPr>
+              <a:t>helped in making the API call to get Census data that is pre-prepared for exploration within the </a:t>
+            </a:r>
+            <a:r>
+              <a:rPr lang="en-US" b="1" i="0" dirty="0" err="1">
+                <a:solidFill>
+                  <a:srgbClr val="202124"/>
+                </a:solidFill>
+                <a:effectLst/>
+                <a:latin typeface="Google Sans"/>
+              </a:rPr>
+              <a:t>tidyverse</a:t>
+            </a:r>
+            <a:r>
+              <a:rPr lang="en-US" b="1" i="0" dirty="0">
+                <a:solidFill>
+                  <a:srgbClr val="202124"/>
+                </a:solidFill>
+                <a:effectLst/>
+                <a:latin typeface="Google Sans"/>
+              </a:rPr>
+              <a:t>.</a:t>
+            </a:r>
+            <a:endParaRPr lang="en-US" dirty="0"/>
+          </a:p>
+          <a:p>
+            <a:r>
+              <a:rPr lang="en-US" dirty="0"/>
+              <a:t>I have used </a:t>
             </a:r>
             <a:r>
               <a:rPr lang="en-US" dirty="0" err="1"/>
@@ -3462,24 +3524,15 @@
             </a:r>
             <a:r>
               <a:rPr lang="en-US" dirty="0"/>
-              <a:t>() - Visualize Regression Model</a:t>
-            </a:r>
-          </a:p>
-          <a:p>
-            <a:endParaRPr lang="en-US" dirty="0"/>
-          </a:p>
-          <a:p>
+              <a:t>() function using </a:t>
+            </a:r>
+            <a:r>
+              <a:rPr lang="en-US" dirty="0" err="1"/>
+              <a:t>ggpubr</a:t>
+            </a:r>
             <a:r>
               <a:rPr lang="en-US" dirty="0"/>
-              <a:t>We can show this model with </a:t>
-            </a:r>
-            <a:r>
-              <a:rPr lang="en-US" dirty="0" err="1"/>
-              <a:t>ggPredict</a:t>
-            </a:r>
-            <a:r>
-              <a:rPr lang="en-US" dirty="0"/>
-              <a:t>() function and adjust the number of regression lines with parameter </a:t>
+              <a:t> library– to Visualize Regression Model and can adjust the number of regression lines with parameter </a:t>
             </a:r>
             <a:r>
               <a:rPr lang="en-US" dirty="0" err="1"/>
@@ -3489,6 +3542,61 @@
               <a:rPr lang="en-US" dirty="0"/>
               <a:t>. </a:t>
             </a:r>
+          </a:p>
+          <a:p>
+            <a:r>
+              <a:rPr lang="en-US" b="0" i="0" dirty="0" err="1">
+                <a:solidFill>
+                  <a:srgbClr val="202124"/>
+                </a:solidFill>
+                <a:effectLst/>
+                <a:latin typeface="Roboto" panose="02000000000000000000" pitchFamily="2" charset="0"/>
+              </a:rPr>
+              <a:t>rvest</a:t>
+            </a:r>
+            <a:r>
+              <a:rPr lang="en-US" b="0" i="0" dirty="0">
+                <a:solidFill>
+                  <a:srgbClr val="202124"/>
+                </a:solidFill>
+                <a:effectLst/>
+                <a:latin typeface="Roboto" panose="02000000000000000000" pitchFamily="2" charset="0"/>
+              </a:rPr>
+              <a:t> library </a:t>
+            </a:r>
+            <a:r>
+              <a:rPr lang="en-US" b="1" i="0" dirty="0">
+                <a:solidFill>
+                  <a:srgbClr val="202124"/>
+                </a:solidFill>
+                <a:effectLst/>
+                <a:latin typeface="Roboto" panose="02000000000000000000" pitchFamily="2" charset="0"/>
+              </a:rPr>
+              <a:t>made scraping the data from web pages possible.</a:t>
+            </a:r>
+          </a:p>
+          <a:p>
+            <a:r>
+              <a:rPr lang="en-US" b="1" i="0" dirty="0" err="1">
+                <a:solidFill>
+                  <a:srgbClr val="202124"/>
+                </a:solidFill>
+                <a:effectLst/>
+                <a:latin typeface="Google Sans"/>
+              </a:rPr>
+              <a:t>Dplyrlibrary</a:t>
+            </a:r>
+            <a:r>
+              <a:rPr lang="en-US" b="1" i="0" dirty="0">
+                <a:solidFill>
+                  <a:srgbClr val="202124"/>
+                </a:solidFill>
+                <a:effectLst/>
+                <a:latin typeface="Google Sans"/>
+              </a:rPr>
+              <a:t> helped me solve the data manipulation challenges.</a:t>
+            </a:r>
+            <a:endParaRPr lang="en-US" dirty="0"/>
           </a:p>
           <a:p>
             <a:endParaRPr lang="en-US" dirty="0"/>
@@ -3522,6 +3630,330 @@
     <p:extLst>
       <p:ext uri="{BB962C8B-B14F-4D97-AF65-F5344CB8AC3E}">
         <p14:creationId xmlns:p14="http://schemas.microsoft.com/office/powerpoint/2010/main" val="2964892918"/>
+      </p:ext>
+    </p:extLst>
+  </p:cSld>
+  <p:clrMapOvr>
+    <a:masterClrMapping/>
+  </p:clrMapOvr>
+</p:notes>
+</file>
+
+<file path=ppt/notesSlides/notesSlide10.xml><?xml version="1.0" encoding="utf-8"?>
+<p:notes xmlns:a="http://schemas.openxmlformats.org/drawingml/2006/main" xmlns:r="http://schemas.openxmlformats.org/officeDocument/2006/relationships" xmlns:p="http://schemas.openxmlformats.org/presentationml/2006/main">
+  <p:cSld>
+    <p:spTree>
+      <p:nvGrpSpPr>
+        <p:cNvPr id="1" name=""/>
+        <p:cNvGrpSpPr/>
+        <p:nvPr/>
+      </p:nvGrpSpPr>
+      <p:grpSpPr>
+        <a:xfrm>
+          <a:off x="0" y="0"/>
+          <a:ext cx="0" cy="0"/>
+          <a:chOff x="0" y="0"/>
+          <a:chExt cx="0" cy="0"/>
+        </a:xfrm>
+      </p:grpSpPr>
+      <p:sp>
+        <p:nvSpPr>
+          <p:cNvPr id="2" name="Slide Image Placeholder 1"/>
+          <p:cNvSpPr>
+            <a:spLocks noGrp="1" noRot="1" noChangeAspect="1"/>
+          </p:cNvSpPr>
+          <p:nvPr>
+            <p:ph type="sldImg"/>
+          </p:nvPr>
+        </p:nvSpPr>
+        <p:spPr/>
+      </p:sp>
+      <p:sp>
+        <p:nvSpPr>
+          <p:cNvPr id="3" name="Notes Placeholder 2"/>
+          <p:cNvSpPr>
+            <a:spLocks noGrp="1"/>
+          </p:cNvSpPr>
+          <p:nvPr>
+            <p:ph type="body" idx="1"/>
+          </p:nvPr>
+        </p:nvSpPr>
+        <p:spPr/>
+        <p:txBody>
+          <a:bodyPr/>
+          <a:lstStyle/>
+          <a:p>
+            <a:r>
+              <a:rPr lang="en-US" b="0" i="0" dirty="0">
+                <a:solidFill>
+                  <a:srgbClr val="202124"/>
+                </a:solidFill>
+                <a:effectLst/>
+                <a:latin typeface="Roboto" panose="02000000000000000000" pitchFamily="2" charset="0"/>
+              </a:rPr>
+              <a:t>Now we will </a:t>
+            </a:r>
+            <a:r>
+              <a:rPr lang="en-US" sz="1200" dirty="0">
+                <a:solidFill>
+                  <a:srgbClr val="0070C0"/>
+                </a:solidFill>
+              </a:rPr>
+              <a:t>analyze the correlation coefficient between the two variables.</a:t>
+            </a:r>
+            <a:endParaRPr lang="en-US" b="0" i="0" dirty="0">
+              <a:solidFill>
+                <a:srgbClr val="202124"/>
+              </a:solidFill>
+              <a:effectLst/>
+              <a:latin typeface="Roboto" panose="02000000000000000000" pitchFamily="2" charset="0"/>
+            </a:endParaRPr>
+          </a:p>
+          <a:p>
+            <a:r>
+              <a:rPr lang="en-US" b="0" i="0" dirty="0">
+                <a:solidFill>
+                  <a:srgbClr val="202124"/>
+                </a:solidFill>
+                <a:effectLst/>
+                <a:latin typeface="Roboto" panose="02000000000000000000" pitchFamily="2" charset="0"/>
+              </a:rPr>
+              <a:t>r is always a number between -1 and 1. </a:t>
+            </a:r>
+            <a:r>
+              <a:rPr lang="en-US" b="1" i="0" dirty="0">
+                <a:solidFill>
+                  <a:srgbClr val="202124"/>
+                </a:solidFill>
+                <a:effectLst/>
+                <a:latin typeface="Roboto" panose="02000000000000000000" pitchFamily="2" charset="0"/>
+              </a:rPr>
+              <a:t>r &gt; 0 indicates a positive association.</a:t>
+            </a:r>
+            <a:r>
+              <a:rPr lang="en-US" b="0" i="0" dirty="0">
+                <a:solidFill>
+                  <a:srgbClr val="202124"/>
+                </a:solidFill>
+                <a:effectLst/>
+                <a:latin typeface="Roboto" panose="02000000000000000000" pitchFamily="2" charset="0"/>
+              </a:rPr>
+              <a:t> </a:t>
+            </a:r>
+            <a:r>
+              <a:rPr lang="en-US" b="1" i="0" dirty="0">
+                <a:solidFill>
+                  <a:srgbClr val="202124"/>
+                </a:solidFill>
+                <a:effectLst/>
+                <a:latin typeface="Roboto" panose="02000000000000000000" pitchFamily="2" charset="0"/>
+              </a:rPr>
+              <a:t>r &lt; 0 indicates a negative association.</a:t>
+            </a:r>
+            <a:r>
+              <a:rPr lang="en-US" b="0" i="0" dirty="0">
+                <a:solidFill>
+                  <a:srgbClr val="202124"/>
+                </a:solidFill>
+                <a:effectLst/>
+                <a:latin typeface="Roboto" panose="02000000000000000000" pitchFamily="2" charset="0"/>
+              </a:rPr>
+              <a:t> </a:t>
+            </a:r>
+            <a:r>
+              <a:rPr lang="en-US" b="1" i="0" dirty="0">
+                <a:solidFill>
+                  <a:srgbClr val="202124"/>
+                </a:solidFill>
+                <a:effectLst/>
+                <a:latin typeface="Roboto" panose="02000000000000000000" pitchFamily="2" charset="0"/>
+              </a:rPr>
+              <a:t>Values of r near 1 indicate a strong linear relationship</a:t>
+            </a:r>
+            <a:r>
+              <a:rPr lang="en-US" b="0" i="0" dirty="0">
+                <a:solidFill>
+                  <a:srgbClr val="202124"/>
+                </a:solidFill>
+                <a:effectLst/>
+                <a:latin typeface="Roboto" panose="02000000000000000000" pitchFamily="2" charset="0"/>
+              </a:rPr>
+              <a:t>.</a:t>
+            </a:r>
+          </a:p>
+          <a:p>
+            <a:r>
+              <a:rPr lang="en-US" b="0" i="0" dirty="0">
+                <a:solidFill>
+                  <a:srgbClr val="202124"/>
+                </a:solidFill>
+                <a:effectLst/>
+                <a:latin typeface="Roboto" panose="02000000000000000000" pitchFamily="2" charset="0"/>
+              </a:rPr>
+              <a:t>In our case, r=0.6 </a:t>
+            </a:r>
+            <a:r>
+              <a:rPr lang="en-US" b="1" i="0" dirty="0">
+                <a:solidFill>
+                  <a:srgbClr val="202124"/>
+                </a:solidFill>
+                <a:effectLst/>
+                <a:latin typeface="Roboto" panose="02000000000000000000" pitchFamily="2" charset="0"/>
+              </a:rPr>
+              <a:t>indicates a strong linear relationship.</a:t>
+            </a:r>
+            <a:endParaRPr lang="en-US" b="0" i="0" dirty="0">
+              <a:solidFill>
+                <a:srgbClr val="202124"/>
+              </a:solidFill>
+              <a:effectLst/>
+              <a:latin typeface="Roboto" panose="02000000000000000000" pitchFamily="2" charset="0"/>
+            </a:endParaRPr>
+          </a:p>
+        </p:txBody>
+      </p:sp>
+      <p:sp>
+        <p:nvSpPr>
+          <p:cNvPr id="4" name="Slide Number Placeholder 3"/>
+          <p:cNvSpPr>
+            <a:spLocks noGrp="1"/>
+          </p:cNvSpPr>
+          <p:nvPr>
+            <p:ph type="sldNum" sz="quarter" idx="5"/>
+          </p:nvPr>
+        </p:nvSpPr>
+        <p:spPr/>
+        <p:txBody>
+          <a:bodyPr/>
+          <a:lstStyle/>
+          <a:p>
+            <a:fld id="{D91607CE-69B0-4DE6-9B29-18F59D9E0C5E}" type="slidenum">
+              <a:rPr lang="en-US" smtClean="0"/>
+              <a:t>12</a:t>
+            </a:fld>
+            <a:endParaRPr lang="en-US"/>
+          </a:p>
+        </p:txBody>
+      </p:sp>
+    </p:spTree>
+    <p:extLst>
+      <p:ext uri="{BB962C8B-B14F-4D97-AF65-F5344CB8AC3E}">
+        <p14:creationId xmlns:p14="http://schemas.microsoft.com/office/powerpoint/2010/main" val="1327219587"/>
+      </p:ext>
+    </p:extLst>
+  </p:cSld>
+  <p:clrMapOvr>
+    <a:masterClrMapping/>
+  </p:clrMapOvr>
+</p:notes>
+</file>
+
+<file path=ppt/notesSlides/notesSlide11.xml><?xml version="1.0" encoding="utf-8"?>
+<p:notes xmlns:a="http://schemas.openxmlformats.org/drawingml/2006/main" xmlns:r="http://schemas.openxmlformats.org/officeDocument/2006/relationships" xmlns:p="http://schemas.openxmlformats.org/presentationml/2006/main">
+  <p:cSld>
+    <p:spTree>
+      <p:nvGrpSpPr>
+        <p:cNvPr id="1" name=""/>
+        <p:cNvGrpSpPr/>
+        <p:nvPr/>
+      </p:nvGrpSpPr>
+      <p:grpSpPr>
+        <a:xfrm>
+          <a:off x="0" y="0"/>
+          <a:ext cx="0" cy="0"/>
+          <a:chOff x="0" y="0"/>
+          <a:chExt cx="0" cy="0"/>
+        </a:xfrm>
+      </p:grpSpPr>
+      <p:sp>
+        <p:nvSpPr>
+          <p:cNvPr id="2" name="Slide Image Placeholder 1"/>
+          <p:cNvSpPr>
+            <a:spLocks noGrp="1" noRot="1" noChangeAspect="1"/>
+          </p:cNvSpPr>
+          <p:nvPr>
+            <p:ph type="sldImg"/>
+          </p:nvPr>
+        </p:nvSpPr>
+        <p:spPr/>
+      </p:sp>
+      <p:sp>
+        <p:nvSpPr>
+          <p:cNvPr id="3" name="Notes Placeholder 2"/>
+          <p:cNvSpPr>
+            <a:spLocks noGrp="1"/>
+          </p:cNvSpPr>
+          <p:nvPr>
+            <p:ph type="body" idx="1"/>
+          </p:nvPr>
+        </p:nvSpPr>
+        <p:spPr/>
+        <p:txBody>
+          <a:bodyPr/>
+          <a:lstStyle/>
+          <a:p>
+            <a:r>
+              <a:rPr lang="en-US" dirty="0"/>
+              <a:t>Since I wanted to find the correlation between per capita income and educational attainment, I was considering to scrape the SAT scores of students.</a:t>
+            </a:r>
+          </a:p>
+          <a:p>
+            <a:endParaRPr lang="en-US" dirty="0"/>
+          </a:p>
+          <a:p>
+            <a:r>
+              <a:rPr lang="en-US" dirty="0"/>
+              <a:t>And found out that it is not a user-friendly scrapable site. So, switch to </a:t>
+            </a:r>
+            <a:r>
+              <a:rPr lang="en-US" sz="1200" dirty="0">
+                <a:latin typeface="Calibri" panose="020F0502020204030204" pitchFamily="34" charset="0"/>
+                <a:cs typeface="Calibri" panose="020F0502020204030204" pitchFamily="34" charset="0"/>
+              </a:rPr>
+              <a:t>'Economic Research Service’ U.S.A site for fetching the education data and performed the we scraping on Wikipedia page for fips code.</a:t>
+            </a:r>
+          </a:p>
+          <a:p>
+            <a:endParaRPr lang="en-US" sz="1200" dirty="0">
+              <a:latin typeface="Calibri" panose="020F0502020204030204" pitchFamily="34" charset="0"/>
+              <a:cs typeface="Calibri" panose="020F0502020204030204" pitchFamily="34" charset="0"/>
+            </a:endParaRPr>
+          </a:p>
+          <a:p>
+            <a:r>
+              <a:rPr lang="en-US" dirty="0"/>
+              <a:t>Merging three data frames was not easily achievable until common column was thoroughly cleaned.</a:t>
+            </a:r>
+          </a:p>
+        </p:txBody>
+      </p:sp>
+      <p:sp>
+        <p:nvSpPr>
+          <p:cNvPr id="4" name="Slide Number Placeholder 3"/>
+          <p:cNvSpPr>
+            <a:spLocks noGrp="1"/>
+          </p:cNvSpPr>
+          <p:nvPr>
+            <p:ph type="sldNum" sz="quarter" idx="5"/>
+          </p:nvPr>
+        </p:nvSpPr>
+        <p:spPr/>
+        <p:txBody>
+          <a:bodyPr/>
+          <a:lstStyle/>
+          <a:p>
+            <a:fld id="{D91607CE-69B0-4DE6-9B29-18F59D9E0C5E}" type="slidenum">
+              <a:rPr lang="en-US" smtClean="0"/>
+              <a:t>13</a:t>
+            </a:fld>
+            <a:endParaRPr lang="en-US"/>
+          </a:p>
+        </p:txBody>
+      </p:sp>
+    </p:spTree>
+    <p:extLst>
+      <p:ext uri="{BB962C8B-B14F-4D97-AF65-F5344CB8AC3E}">
+        <p14:creationId xmlns:p14="http://schemas.microsoft.com/office/powerpoint/2010/main" val="1785557887"/>
       </p:ext>
     </p:extLst>
   </p:cSld>
@@ -3577,72 +4009,100 @@
           <a:p>
             <a:r>
               <a:rPr lang="en-US" dirty="0"/>
-              <a:t>When performing the web scraping from Wikipedia, the html source code is generated by calling the </a:t>
-            </a:r>
-            <a:r>
-              <a:rPr lang="en-US" dirty="0" err="1"/>
-              <a:t>read_html</a:t>
-            </a:r>
+              <a:t>I have fetched the data from three data sources.</a:t>
+            </a:r>
+          </a:p>
+          <a:p>
+            <a:pPr marL="0" marR="0" lvl="0" indent="0" algn="l" defTabSz="914400" rtl="0" eaLnBrk="1" fontAlgn="auto" latinLnBrk="0" hangingPunct="1">
+              <a:lnSpc>
+                <a:spcPct val="100000"/>
+              </a:lnSpc>
+              <a:spcBef>
+                <a:spcPts val="0"/>
+              </a:spcBef>
+              <a:spcAft>
+                <a:spcPts val="0"/>
+              </a:spcAft>
+              <a:buClrTx/>
+              <a:buSzTx/>
+              <a:buFontTx/>
+              <a:buNone/>
+              <a:tabLst/>
+              <a:defRPr/>
+            </a:pPr>
             <a:r>
               <a:rPr lang="en-US" dirty="0"/>
-              <a:t> function.</a:t>
-            </a:r>
-          </a:p>
-          <a:p>
+              <a:t>After performing the exploratory data analysis and thoroughly cleaning the data during the ETL process, designed a relational database.</a:t>
+            </a:r>
+          </a:p>
+          <a:p>
+            <a:pPr marL="0" marR="0" lvl="0" indent="0" algn="l" defTabSz="914400" rtl="0" eaLnBrk="1" fontAlgn="auto" latinLnBrk="0" hangingPunct="1">
+              <a:lnSpc>
+                <a:spcPct val="100000"/>
+              </a:lnSpc>
+              <a:spcBef>
+                <a:spcPts val="0"/>
+              </a:spcBef>
+              <a:spcAft>
+                <a:spcPts val="0"/>
+              </a:spcAft>
+              <a:buClrTx/>
+              <a:buSzTx/>
+              <a:buFontTx/>
+              <a:buNone/>
+              <a:tabLst/>
+              <a:defRPr/>
+            </a:pPr>
             <a:r>
               <a:rPr lang="en-US" dirty="0"/>
-              <a:t>I used </a:t>
-            </a:r>
-            <a:r>
-              <a:rPr lang="en-US" dirty="0" err="1"/>
-              <a:t>html_nodes</a:t>
-            </a:r>
+              <a:t>Then applied the Linear regression model to find the correlation between the variables.</a:t>
+            </a:r>
+          </a:p>
+          <a:p>
+            <a:pPr marL="0" marR="0" lvl="0" indent="0" algn="l" defTabSz="914400" rtl="0" eaLnBrk="1" fontAlgn="auto" latinLnBrk="0" hangingPunct="1">
+              <a:lnSpc>
+                <a:spcPct val="100000"/>
+              </a:lnSpc>
+              <a:spcBef>
+                <a:spcPts val="0"/>
+              </a:spcBef>
+              <a:spcAft>
+                <a:spcPts val="0"/>
+              </a:spcAft>
+              <a:buClrTx/>
+              <a:buSzTx/>
+              <a:buFontTx/>
+              <a:buNone/>
+              <a:tabLst/>
+              <a:defRPr/>
+            </a:pPr>
             <a:r>
               <a:rPr lang="en-US" dirty="0"/>
-              <a:t> function using CSS Selector and a table is generated using </a:t>
-            </a:r>
-            <a:r>
-              <a:rPr lang="en-US" dirty="0" err="1"/>
-              <a:t>html_table</a:t>
-            </a:r>
-            <a:r>
-              <a:rPr lang="en-US" dirty="0"/>
-              <a:t> function.</a:t>
-            </a:r>
-          </a:p>
-          <a:p>
+              <a:t>And finally interpret the results.</a:t>
+            </a:r>
+          </a:p>
+          <a:p>
+            <a:pPr marL="0" marR="0" lvl="0" indent="0" algn="l" defTabSz="914400" rtl="0" eaLnBrk="1" fontAlgn="auto" latinLnBrk="0" hangingPunct="1">
+              <a:lnSpc>
+                <a:spcPct val="100000"/>
+              </a:lnSpc>
+              <a:spcBef>
+                <a:spcPts val="0"/>
+              </a:spcBef>
+              <a:spcAft>
+                <a:spcPts val="0"/>
+              </a:spcAft>
+              <a:buClrTx/>
+              <a:buSzTx/>
+              <a:buFontTx/>
+              <a:buNone/>
+              <a:tabLst/>
+              <a:defRPr/>
+            </a:pPr>
             <a:endParaRPr lang="en-US" dirty="0"/>
           </a:p>
           <a:p>
-            <a:r>
-              <a:rPr lang="en-US" dirty="0"/>
-              <a:t>Next, I access the Census API key, save it in the environmental variable  and fetched the Census Data for the year 2020.</a:t>
-            </a:r>
-          </a:p>
-          <a:p>
             <a:endParaRPr lang="en-US" dirty="0"/>
-          </a:p>
-          <a:p>
-            <a:r>
-              <a:rPr lang="en-US" dirty="0"/>
-              <a:t>And lastly, after downloading the csv file from the USDA, I imported the raw data into the </a:t>
-            </a:r>
-            <a:r>
-              <a:rPr lang="en-US" dirty="0" err="1"/>
-              <a:t>Rmd</a:t>
-            </a:r>
-            <a:r>
-              <a:rPr lang="en-US" dirty="0"/>
-              <a:t> file from </a:t>
-            </a:r>
-            <a:r>
-              <a:rPr lang="en-US" dirty="0" err="1"/>
-              <a:t>Github</a:t>
-            </a:r>
-            <a:r>
-              <a:rPr lang="en-US" dirty="0"/>
-              <a:t>.</a:t>
-            </a:r>
           </a:p>
         </p:txBody>
       </p:sp>
@@ -3663,7 +4123,7 @@
           <a:p>
             <a:fld id="{D91607CE-69B0-4DE6-9B29-18F59D9E0C5E}" type="slidenum">
               <a:rPr lang="en-US" smtClean="0"/>
-              <a:t>5</a:t>
+              <a:t>4</a:t>
             </a:fld>
             <a:endParaRPr lang="en-US"/>
           </a:p>
@@ -3672,7 +4132,7 @@
     </p:spTree>
     <p:extLst>
       <p:ext uri="{BB962C8B-B14F-4D97-AF65-F5344CB8AC3E}">
-        <p14:creationId xmlns:p14="http://schemas.microsoft.com/office/powerpoint/2010/main" val="417447011"/>
+        <p14:creationId xmlns:p14="http://schemas.microsoft.com/office/powerpoint/2010/main" val="2711217439"/>
       </p:ext>
     </p:extLst>
   </p:cSld>
@@ -3726,7 +4186,85 @@
           <a:bodyPr/>
           <a:lstStyle/>
           <a:p>
+            <a:r>
+              <a:rPr lang="en-US" dirty="0"/>
+              <a:t>When performing the web scraping from Wikipedia, the html source code is generated by calling the </a:t>
+            </a:r>
+            <a:r>
+              <a:rPr lang="en-US" dirty="0" err="1"/>
+              <a:t>read_html</a:t>
+            </a:r>
+            <a:r>
+              <a:rPr lang="en-US" dirty="0"/>
+              <a:t> function.</a:t>
+            </a:r>
+          </a:p>
+          <a:p>
             <a:endParaRPr lang="en-US" dirty="0"/>
+          </a:p>
+          <a:p>
+            <a:r>
+              <a:rPr lang="en-US" dirty="0"/>
+              <a:t>I used </a:t>
+            </a:r>
+            <a:r>
+              <a:rPr lang="en-US" dirty="0" err="1"/>
+              <a:t>html_nodes</a:t>
+            </a:r>
+            <a:r>
+              <a:rPr lang="en-US" dirty="0"/>
+              <a:t> function using CSS Selector and generated a table using </a:t>
+            </a:r>
+            <a:r>
+              <a:rPr lang="en-US" dirty="0" err="1"/>
+              <a:t>html_table</a:t>
+            </a:r>
+            <a:r>
+              <a:rPr lang="en-US" dirty="0"/>
+              <a:t> function.</a:t>
+            </a:r>
+          </a:p>
+          <a:p>
+            <a:endParaRPr lang="en-US" dirty="0"/>
+          </a:p>
+          <a:p>
+            <a:r>
+              <a:rPr lang="en-US" dirty="0"/>
+              <a:t>Next, I access the Census API key, save it in the environmental variable  and fetched the Census Data for the year 2020.</a:t>
+            </a:r>
+          </a:p>
+          <a:p>
+            <a:endParaRPr lang="en-US" dirty="0"/>
+          </a:p>
+          <a:p>
+            <a:r>
+              <a:rPr lang="en-US" dirty="0"/>
+              <a:t>And lastly, after downloading the csv file from the </a:t>
+            </a:r>
+            <a:r>
+              <a:rPr lang="en-US" dirty="0" err="1"/>
+              <a:t>USDept</a:t>
+            </a:r>
+            <a:r>
+              <a:rPr lang="en-US" dirty="0"/>
+              <a:t>. of Agriculture, I imported the raw data into the </a:t>
+            </a:r>
+            <a:r>
+              <a:rPr lang="en-US" dirty="0" err="1"/>
+              <a:t>Rmd</a:t>
+            </a:r>
+            <a:r>
+              <a:rPr lang="en-US" dirty="0"/>
+              <a:t> file from </a:t>
+            </a:r>
+            <a:r>
+              <a:rPr lang="en-US" dirty="0" err="1"/>
+              <a:t>Github</a:t>
+            </a:r>
+            <a:r>
+              <a:rPr lang="en-US" dirty="0"/>
+              <a:t>.</a:t>
+            </a:r>
           </a:p>
         </p:txBody>
       </p:sp>
@@ -3747,7 +4285,7 @@
           <a:p>
             <a:fld id="{D91607CE-69B0-4DE6-9B29-18F59D9E0C5E}" type="slidenum">
               <a:rPr lang="en-US" smtClean="0"/>
-              <a:t>6</a:t>
+              <a:t>5</a:t>
             </a:fld>
             <a:endParaRPr lang="en-US"/>
           </a:p>
@@ -3756,7 +4294,7 @@
     </p:spTree>
     <p:extLst>
       <p:ext uri="{BB962C8B-B14F-4D97-AF65-F5344CB8AC3E}">
-        <p14:creationId xmlns:p14="http://schemas.microsoft.com/office/powerpoint/2010/main" val="1906942562"/>
+        <p14:creationId xmlns:p14="http://schemas.microsoft.com/office/powerpoint/2010/main" val="417447011"/>
       </p:ext>
     </p:extLst>
   </p:cSld>
@@ -3812,32 +4350,96 @@
           <a:p>
             <a:r>
               <a:rPr lang="en-US" dirty="0"/>
-              <a:t>Before applying the linear regression model, the following four assumption must be made. And it is important to visualize the data based on these assumption.</a:t>
-            </a:r>
-          </a:p>
-          <a:p>
-            <a:r>
-              <a:rPr lang="en-US" dirty="0"/>
-              <a:t>Since there is only one independent variable and one dependent variable, we don’t need to test for any hidden relationships among variables.</a:t>
-            </a:r>
-          </a:p>
-          <a:p>
-            <a:r>
-              <a:rPr lang="en-US" dirty="0"/>
-              <a:t>The normality can be checked by using the hist() function, which tells whether the dependent variable follows a normal distribution or not.</a:t>
-            </a:r>
-          </a:p>
-          <a:p>
-            <a:r>
-              <a:rPr lang="en-US" dirty="0"/>
-              <a:t>The histograms show that our data follows the normal distribution.</a:t>
-            </a:r>
-          </a:p>
-          <a:p>
-            <a:r>
-              <a:rPr lang="en-US" dirty="0"/>
-              <a:t>The relationship between the independent and dependent variable must be linear. We can test this visually with a scatter plot to see if the distribution of data points could be described with a straight line.</a:t>
-            </a:r>
+              <a:t>Now my three </a:t>
+            </a:r>
+            <a:r>
+              <a:rPr lang="en-US" sz="1200" dirty="0" err="1">
+                <a:latin typeface="Calibri" panose="020F0502020204030204" pitchFamily="34" charset="0"/>
+                <a:cs typeface="Calibri" panose="020F0502020204030204" pitchFamily="34" charset="0"/>
+              </a:rPr>
+              <a:t>dataframes</a:t>
+            </a:r>
+            <a:r>
+              <a:rPr lang="en-US" sz="1200" dirty="0">
+                <a:latin typeface="Calibri" panose="020F0502020204030204" pitchFamily="34" charset="0"/>
+                <a:cs typeface="Calibri" panose="020F0502020204030204" pitchFamily="34" charset="0"/>
+              </a:rPr>
+              <a:t> are ready to be cleaned.</a:t>
+            </a:r>
+          </a:p>
+          <a:p>
+            <a:endParaRPr lang="en-US" sz="1200" dirty="0">
+              <a:latin typeface="Calibri" panose="020F0502020204030204" pitchFamily="34" charset="0"/>
+              <a:cs typeface="Calibri" panose="020F0502020204030204" pitchFamily="34" charset="0"/>
+            </a:endParaRPr>
+          </a:p>
+          <a:p>
+            <a:r>
+              <a:rPr lang="en-US" sz="1200" dirty="0">
+                <a:latin typeface="Calibri" panose="020F0502020204030204" pitchFamily="34" charset="0"/>
+                <a:cs typeface="Calibri" panose="020F0502020204030204" pitchFamily="34" charset="0"/>
+              </a:rPr>
+              <a:t>For that I performed the following mentioned operations.</a:t>
+            </a:r>
+          </a:p>
+          <a:p>
+            <a:endParaRPr lang="en-US" sz="1200" dirty="0">
+              <a:latin typeface="Calibri" panose="020F0502020204030204" pitchFamily="34" charset="0"/>
+              <a:cs typeface="Calibri" panose="020F0502020204030204" pitchFamily="34" charset="0"/>
+            </a:endParaRPr>
+          </a:p>
+          <a:p>
+            <a:r>
+              <a:rPr lang="en-US" sz="1200" dirty="0">
+                <a:latin typeface="Calibri" panose="020F0502020204030204" pitchFamily="34" charset="0"/>
+                <a:cs typeface="Calibri" panose="020F0502020204030204" pitchFamily="34" charset="0"/>
+              </a:rPr>
+              <a:t>Also, exported the three files as CSV to the working directory for designing the relational database.</a:t>
+            </a:r>
+          </a:p>
+          <a:p>
+            <a:endParaRPr lang="en-US" sz="1200" dirty="0">
+              <a:latin typeface="Calibri" panose="020F0502020204030204" pitchFamily="34" charset="0"/>
+              <a:cs typeface="Calibri" panose="020F0502020204030204" pitchFamily="34" charset="0"/>
+            </a:endParaRPr>
+          </a:p>
+          <a:p>
+            <a:r>
+              <a:rPr lang="en-US" sz="1200" dirty="0">
+                <a:latin typeface="Calibri" panose="020F0502020204030204" pitchFamily="34" charset="0"/>
+                <a:cs typeface="Calibri" panose="020F0502020204030204" pitchFamily="34" charset="0"/>
+              </a:rPr>
+              <a:t>And finally, merging the three </a:t>
+            </a:r>
+            <a:r>
+              <a:rPr lang="en-US" sz="1200" dirty="0" err="1">
+                <a:latin typeface="Calibri" panose="020F0502020204030204" pitchFamily="34" charset="0"/>
+                <a:cs typeface="Calibri" panose="020F0502020204030204" pitchFamily="34" charset="0"/>
+              </a:rPr>
+              <a:t>datframes</a:t>
+            </a:r>
+            <a:r>
+              <a:rPr lang="en-US" sz="1200" dirty="0">
+                <a:latin typeface="Calibri" panose="020F0502020204030204" pitchFamily="34" charset="0"/>
+                <a:cs typeface="Calibri" panose="020F0502020204030204" pitchFamily="34" charset="0"/>
+              </a:rPr>
+              <a:t> into new </a:t>
+            </a:r>
+            <a:r>
+              <a:rPr lang="en-US" sz="1200" dirty="0" err="1">
+                <a:latin typeface="Calibri" panose="020F0502020204030204" pitchFamily="34" charset="0"/>
+                <a:cs typeface="Calibri" panose="020F0502020204030204" pitchFamily="34" charset="0"/>
+              </a:rPr>
+              <a:t>dataframe</a:t>
+            </a:r>
+            <a:r>
+              <a:rPr lang="en-US" sz="1200" dirty="0">
+                <a:latin typeface="Calibri" panose="020F0502020204030204" pitchFamily="34" charset="0"/>
+                <a:cs typeface="Calibri" panose="020F0502020204030204" pitchFamily="34" charset="0"/>
+              </a:rPr>
+              <a:t> to investigate the impact of per capita income on education.</a:t>
+            </a:r>
+            <a:endParaRPr lang="en-US" dirty="0"/>
           </a:p>
         </p:txBody>
       </p:sp>
@@ -3858,7 +4460,7 @@
           <a:p>
             <a:fld id="{D91607CE-69B0-4DE6-9B29-18F59D9E0C5E}" type="slidenum">
               <a:rPr lang="en-US" smtClean="0"/>
-              <a:t>8</a:t>
+              <a:t>6</a:t>
             </a:fld>
             <a:endParaRPr lang="en-US"/>
           </a:p>
@@ -3867,7 +4469,7 @@
     </p:spTree>
     <p:extLst>
       <p:ext uri="{BB962C8B-B14F-4D97-AF65-F5344CB8AC3E}">
-        <p14:creationId xmlns:p14="http://schemas.microsoft.com/office/powerpoint/2010/main" val="1609308609"/>
+        <p14:creationId xmlns:p14="http://schemas.microsoft.com/office/powerpoint/2010/main" val="1906942562"/>
       </p:ext>
     </p:extLst>
   </p:cSld>
@@ -3923,7 +4525,13 @@
           <a:p>
             <a:r>
               <a:rPr lang="en-US" dirty="0"/>
-              <a:t>This scatter plot is showing a linear relationship between x and y variables.</a:t>
+              <a:t>Here is the relational database design performed using the tool Quick DBD</a:t>
+            </a:r>
+          </a:p>
+          <a:p>
+            <a:r>
+              <a:rPr lang="en-US" dirty="0"/>
+              <a:t>And the CSVs are ready to be imported into PostgreSQL database.</a:t>
             </a:r>
           </a:p>
         </p:txBody>
@@ -3945,7 +4553,7 @@
           <a:p>
             <a:fld id="{D91607CE-69B0-4DE6-9B29-18F59D9E0C5E}" type="slidenum">
               <a:rPr lang="en-US" smtClean="0"/>
-              <a:t>9</a:t>
+              <a:t>7</a:t>
             </a:fld>
             <a:endParaRPr lang="en-US"/>
           </a:p>
@@ -3954,7 +4562,7 @@
     </p:spTree>
     <p:extLst>
       <p:ext uri="{BB962C8B-B14F-4D97-AF65-F5344CB8AC3E}">
-        <p14:creationId xmlns:p14="http://schemas.microsoft.com/office/powerpoint/2010/main" val="2783689236"/>
+        <p14:creationId xmlns:p14="http://schemas.microsoft.com/office/powerpoint/2010/main" val="3034812331"/>
       </p:ext>
     </p:extLst>
   </p:cSld>
@@ -4010,24 +4618,41 @@
           <a:p>
             <a:r>
               <a:rPr lang="en-US" dirty="0"/>
-              <a:t>The red lines representing the mean of the residuals are all basically horizontal and centered around zero. This means there are no outliers or biases in the data that would make a linear regression invalid.</a:t>
+              <a:t>Before applying the linear regression model, the following four assumption must be made. And it is important to visualize the data based on these assumption.</a:t>
             </a:r>
           </a:p>
           <a:p>
             <a:endParaRPr lang="en-US" dirty="0"/>
           </a:p>
           <a:p>
+            <a:pPr marL="228600" indent="-228600">
+              <a:buAutoNum type="arabicPeriod"/>
+            </a:pPr>
+            <a:r>
+              <a:rPr lang="en-US" sz="1200" dirty="0"/>
+              <a:t>For the Independence of observations : </a:t>
+            </a:r>
             <a:r>
               <a:rPr lang="en-US" dirty="0"/>
-              <a:t>In the Normal Q-</a:t>
-            </a:r>
-            <a:r>
-              <a:rPr lang="en-US" dirty="0" err="1"/>
-              <a:t>Qplot</a:t>
-            </a:r>
+              <a:t>Since there is only one independent variable and one dependent variable, we don’t need to test for any hidden relationships among variables.</a:t>
+            </a:r>
+          </a:p>
+          <a:p>
+            <a:pPr marL="228600" indent="-228600">
+              <a:buAutoNum type="arabicPeriod"/>
+            </a:pPr>
+            <a:endParaRPr lang="en-US" dirty="0"/>
+          </a:p>
+          <a:p>
             <a:r>
               <a:rPr lang="en-US" dirty="0"/>
-              <a:t> in the top right, we can see that the real residuals from our model form an almost perfectly one-to-one line with the theoretical residuals from a perfect model.</a:t>
+              <a:t>2. The normality can be checked by using the hist() function, which tells whether the dependent variable follows a normal distribution or not.</a:t>
+            </a:r>
+          </a:p>
+          <a:p>
+            <a:r>
+              <a:rPr lang="en-US" dirty="0"/>
+              <a:t>And the histograms show that our data follows the normal distribution.</a:t>
             </a:r>
           </a:p>
           <a:p>
@@ -4036,17 +4661,13 @@
           <a:p>
             <a:r>
               <a:rPr lang="en-US" dirty="0"/>
-              <a:t>Based on these residuals, we can say that our model meets the assumption of homoscedasticity.</a:t>
-            </a:r>
-          </a:p>
-          <a:p>
+              <a:t>For checking the </a:t>
+            </a:r>
+            <a:r>
+              <a:rPr lang="en-US" sz="1200" dirty="0"/>
+              <a:t>Linearity among the variables, and homogeneity of variance we will go to the next slides.</a:t>
+            </a:r>
             <a:endParaRPr lang="en-US" dirty="0"/>
-          </a:p>
-          <a:p>
-            <a:r>
-              <a:rPr lang="en-US" dirty="0"/>
-              <a:t>and the appropriate visualizations helps us better understand the data.</a:t>
-            </a:r>
           </a:p>
         </p:txBody>
       </p:sp>
@@ -4067,7 +4688,7 @@
           <a:p>
             <a:fld id="{D91607CE-69B0-4DE6-9B29-18F59D9E0C5E}" type="slidenum">
               <a:rPr lang="en-US" smtClean="0"/>
-              <a:t>10</a:t>
+              <a:t>8</a:t>
             </a:fld>
             <a:endParaRPr lang="en-US"/>
           </a:p>
@@ -4076,7 +4697,7 @@
     </p:spTree>
     <p:extLst>
       <p:ext uri="{BB962C8B-B14F-4D97-AF65-F5344CB8AC3E}">
-        <p14:creationId xmlns:p14="http://schemas.microsoft.com/office/powerpoint/2010/main" val="3944038424"/>
+        <p14:creationId xmlns:p14="http://schemas.microsoft.com/office/powerpoint/2010/main" val="1609308609"/>
       </p:ext>
     </p:extLst>
   </p:cSld>
@@ -4132,7 +4753,7 @@
           <a:p>
             <a:r>
               <a:rPr lang="en-US" dirty="0"/>
-              <a:t>Interpretation:</a:t>
+              <a:t>3. The relationship between the independent and dependent variable must be linear. We can test this visually with a scatter plot to see if the distribution of data points could be described with a straight line.</a:t>
             </a:r>
           </a:p>
           <a:p>
@@ -4141,59 +4762,8 @@
           <a:p>
             <a:r>
               <a:rPr lang="en-US" dirty="0"/>
-              <a:t>A large F-statistic will correspond to a statistically significant p-value (p &lt; 0.05). In our example, the F-statistic equal 62.7 producing a p-value: 5.83e-13, which is highly significant. This means that, the predictor variables is significantly related to the outcome variable.</a:t>
-            </a:r>
-          </a:p>
-          <a:p>
-            <a:endParaRPr lang="en-US" dirty="0"/>
-          </a:p>
-          <a:p>
-            <a:r>
-              <a:rPr lang="en-US" dirty="0"/>
-              <a:t>And we accept the alternate hypothesis that our regression model fits the data better than the intercept-only model.</a:t>
-            </a:r>
-          </a:p>
-          <a:p>
-            <a:endParaRPr lang="en-US" dirty="0"/>
-          </a:p>
-          <a:p>
-            <a:r>
-              <a:rPr lang="en-US" dirty="0"/>
-              <a:t>For a given predictor, the t-statistic evaluates whether there is significant association between the predictor and the outcome variable, that is whether the beta coefficient of the predictor is significantly different from zero.</a:t>
-            </a:r>
-          </a:p>
-          <a:p>
-            <a:endParaRPr lang="en-US" dirty="0"/>
-          </a:p>
-          <a:p>
-            <a:r>
-              <a:rPr lang="en-US" dirty="0"/>
-              <a:t>we can see, changing the per_capita_income variable is significantly associated to changes in percent_of_adults_with_a_bachelor_degree_or_higher_2015_19 </a:t>
-            </a:r>
-          </a:p>
-          <a:p>
-            <a:endParaRPr lang="en-US" dirty="0"/>
-          </a:p>
-          <a:p>
-            <a:r>
-              <a:rPr lang="en-US" dirty="0"/>
-              <a:t>For a given predictor variable, the coefficient (b) can be interpreted as the average effect on y of a one unit increase in predictor, holding all other predictors fixed.</a:t>
-            </a:r>
-          </a:p>
-          <a:p>
-            <a:endParaRPr lang="en-US" dirty="0"/>
-          </a:p>
-          <a:p>
-            <a:r>
-              <a:rPr lang="en-US" dirty="0"/>
-              <a:t>One unit increase in per_capita_income will significantly increase percent_of_adults_with_a_bachelor_degree_or_higher_2015_19, holding all other predictors fixed.</a:t>
-            </a:r>
-          </a:p>
-          <a:p>
-            <a:endParaRPr lang="en-US" dirty="0"/>
-          </a:p>
-          <a:p>
-            <a:endParaRPr lang="en-US" dirty="0"/>
+              <a:t>This scatter plot is showing a pretty linear relationship between x and y variables.</a:t>
+            </a:r>
           </a:p>
         </p:txBody>
       </p:sp>
@@ -4214,7 +4784,7 @@
           <a:p>
             <a:fld id="{D91607CE-69B0-4DE6-9B29-18F59D9E0C5E}" type="slidenum">
               <a:rPr lang="en-US" smtClean="0"/>
-              <a:t>11</a:t>
+              <a:t>9</a:t>
             </a:fld>
             <a:endParaRPr lang="en-US"/>
           </a:p>
@@ -4223,7 +4793,7 @@
     </p:spTree>
     <p:extLst>
       <p:ext uri="{BB962C8B-B14F-4D97-AF65-F5344CB8AC3E}">
-        <p14:creationId xmlns:p14="http://schemas.microsoft.com/office/powerpoint/2010/main" val="1215152824"/>
+        <p14:creationId xmlns:p14="http://schemas.microsoft.com/office/powerpoint/2010/main" val="2783689236"/>
       </p:ext>
     </p:extLst>
   </p:cSld>
@@ -4277,85 +4847,76 @@
           <a:bodyPr/>
           <a:lstStyle/>
           <a:p>
-            <a:r>
-              <a:rPr lang="en-US" b="0" i="0" dirty="0">
-                <a:solidFill>
-                  <a:srgbClr val="202124"/>
-                </a:solidFill>
-                <a:effectLst/>
-                <a:latin typeface="Roboto" panose="02000000000000000000" pitchFamily="2" charset="0"/>
-              </a:rPr>
-              <a:t>r is always a number between -1 and 1. </a:t>
-            </a:r>
-            <a:r>
-              <a:rPr lang="en-US" b="1" i="0" dirty="0">
-                <a:solidFill>
-                  <a:srgbClr val="202124"/>
-                </a:solidFill>
-                <a:effectLst/>
-                <a:latin typeface="Roboto" panose="02000000000000000000" pitchFamily="2" charset="0"/>
-              </a:rPr>
-              <a:t>r &gt; 0 indicates a positive association.</a:t>
-            </a:r>
-            <a:r>
-              <a:rPr lang="en-US" b="0" i="0" dirty="0">
-                <a:solidFill>
-                  <a:srgbClr val="202124"/>
-                </a:solidFill>
-                <a:effectLst/>
-                <a:latin typeface="Roboto" panose="02000000000000000000" pitchFamily="2" charset="0"/>
-              </a:rPr>
-              <a:t> </a:t>
-            </a:r>
-            <a:r>
-              <a:rPr lang="en-US" b="1" i="0" dirty="0">
-                <a:solidFill>
-                  <a:srgbClr val="202124"/>
-                </a:solidFill>
-                <a:effectLst/>
-                <a:latin typeface="Roboto" panose="02000000000000000000" pitchFamily="2" charset="0"/>
-              </a:rPr>
-              <a:t>r &lt; 0 indicates a negative association.</a:t>
-            </a:r>
-            <a:r>
-              <a:rPr lang="en-US" b="0" i="0" dirty="0">
-                <a:solidFill>
-                  <a:srgbClr val="202124"/>
-                </a:solidFill>
-                <a:effectLst/>
-                <a:latin typeface="Roboto" panose="02000000000000000000" pitchFamily="2" charset="0"/>
-              </a:rPr>
-              <a:t> </a:t>
-            </a:r>
-            <a:r>
-              <a:rPr lang="en-US" b="1" i="0" dirty="0">
-                <a:solidFill>
-                  <a:srgbClr val="202124"/>
-                </a:solidFill>
-                <a:effectLst/>
-                <a:latin typeface="Roboto" panose="02000000000000000000" pitchFamily="2" charset="0"/>
-              </a:rPr>
-              <a:t>Values of r near 0 indicate a very weak linear relationship</a:t>
-            </a:r>
-            <a:r>
-              <a:rPr lang="en-US" b="0" i="0" dirty="0">
-                <a:solidFill>
-                  <a:srgbClr val="202124"/>
-                </a:solidFill>
-                <a:effectLst/>
-                <a:latin typeface="Roboto" panose="02000000000000000000" pitchFamily="2" charset="0"/>
-              </a:rPr>
-              <a:t>.</a:t>
-            </a:r>
-          </a:p>
-          <a:p>
-            <a:endParaRPr lang="en-US" b="0" i="0" dirty="0">
-              <a:solidFill>
-                <a:srgbClr val="202124"/>
-              </a:solidFill>
-              <a:effectLst/>
-              <a:latin typeface="Roboto" panose="02000000000000000000" pitchFamily="2" charset="0"/>
-            </a:endParaRPr>
+            <a:pPr marL="0" marR="0" lvl="0" indent="0" algn="l" defTabSz="914400" rtl="0" eaLnBrk="1" fontAlgn="auto" latinLnBrk="0" hangingPunct="1">
+              <a:lnSpc>
+                <a:spcPct val="100000"/>
+              </a:lnSpc>
+              <a:spcBef>
+                <a:spcPts val="0"/>
+              </a:spcBef>
+              <a:spcAft>
+                <a:spcPts val="0"/>
+              </a:spcAft>
+              <a:buClrTx/>
+              <a:buSzTx/>
+              <a:buFontTx/>
+              <a:buNone/>
+              <a:tabLst/>
+              <a:defRPr/>
+            </a:pPr>
+            <a:r>
+              <a:rPr lang="en-US" dirty="0"/>
+              <a:t>4. And a series of visualization is plotted to check the </a:t>
+            </a:r>
+            <a:r>
+              <a:rPr lang="en-US" sz="1200" dirty="0"/>
+              <a:t>homogeneity of variance. </a:t>
+            </a:r>
+            <a:endParaRPr lang="en-US" dirty="0"/>
+          </a:p>
+          <a:p>
+            <a:endParaRPr lang="en-US" dirty="0"/>
+          </a:p>
+          <a:p>
+            <a:r>
+              <a:rPr lang="en-US" dirty="0"/>
+              <a:t>The red lines representing the mean of the residuals are all basically horizontal and centered around zero. This means there are no outliers or biases in the data that would make a linear regression invalid.</a:t>
+            </a:r>
+          </a:p>
+          <a:p>
+            <a:endParaRPr lang="en-US" dirty="0"/>
+          </a:p>
+          <a:p>
+            <a:r>
+              <a:rPr lang="en-US" dirty="0"/>
+              <a:t>In the Normal Q-</a:t>
+            </a:r>
+            <a:r>
+              <a:rPr lang="en-US" dirty="0" err="1"/>
+              <a:t>Qplot</a:t>
+            </a:r>
+            <a:r>
+              <a:rPr lang="en-US" dirty="0"/>
+              <a:t> in the top right, we can see that the real residuals from our model form an almost perfectly one-to-one line with the theoretical residuals from a perfect model.</a:t>
+            </a:r>
+          </a:p>
+          <a:p>
+            <a:endParaRPr lang="en-US" dirty="0"/>
+          </a:p>
+          <a:p>
+            <a:r>
+              <a:rPr lang="en-US" dirty="0"/>
+              <a:t>Based on these residuals, we can say that our model meets the assumption of homoscedasticity.</a:t>
+            </a:r>
+          </a:p>
+          <a:p>
+            <a:endParaRPr lang="en-US" dirty="0"/>
+          </a:p>
+          <a:p>
+            <a:r>
+              <a:rPr lang="en-US" dirty="0"/>
+              <a:t>and the appropriate visualizations helps us better understand the data.</a:t>
+            </a:r>
           </a:p>
         </p:txBody>
       </p:sp>
@@ -4376,7 +4937,7 @@
           <a:p>
             <a:fld id="{D91607CE-69B0-4DE6-9B29-18F59D9E0C5E}" type="slidenum">
               <a:rPr lang="en-US" smtClean="0"/>
-              <a:t>12</a:t>
+              <a:t>10</a:t>
             </a:fld>
             <a:endParaRPr lang="en-US"/>
           </a:p>
@@ -4385,7 +4946,7 @@
     </p:spTree>
     <p:extLst>
       <p:ext uri="{BB962C8B-B14F-4D97-AF65-F5344CB8AC3E}">
-        <p14:creationId xmlns:p14="http://schemas.microsoft.com/office/powerpoint/2010/main" val="1327219587"/>
+        <p14:creationId xmlns:p14="http://schemas.microsoft.com/office/powerpoint/2010/main" val="3944038424"/>
       </p:ext>
     </p:extLst>
   </p:cSld>
@@ -4441,27 +5002,118 @@
           <a:p>
             <a:r>
               <a:rPr lang="en-US" dirty="0"/>
-              <a:t>Found out that it is not a user-friendly scrapable site. So, switch to </a:t>
-            </a:r>
-            <a:r>
-              <a:rPr lang="en-US" sz="1200" dirty="0">
-                <a:latin typeface="Calibri" panose="020F0502020204030204" pitchFamily="34" charset="0"/>
-                <a:cs typeface="Calibri" panose="020F0502020204030204" pitchFamily="34" charset="0"/>
+              <a:t>Interpretation:</a:t>
+            </a:r>
+          </a:p>
+          <a:p>
+            <a:endParaRPr lang="en-US" dirty="0"/>
+          </a:p>
+          <a:p>
+            <a:r>
+              <a:rPr lang="en-US" dirty="0"/>
+              <a:t>A large F-statistic will correspond to a statistically significant p-value (p &lt; 0.05). In our example, the F-statistic equal 62.7 producing a p-value: 5.83e-13, which is highly significant. This means that, the predictor variables is significantly related to the outcome variable.</a:t>
+            </a:r>
+          </a:p>
+          <a:p>
+            <a:endParaRPr lang="en-US" dirty="0"/>
+          </a:p>
+          <a:p>
+            <a:r>
+              <a:rPr lang="en-US" dirty="0">
+                <a:solidFill>
+                  <a:srgbClr val="0070C0"/>
+                </a:solidFill>
               </a:rPr>
-              <a:t>'Economic Research Service’ U.S. DEPARTMENT OF AGRICULTURE site for education data and performed the we scraping on Wikipedia page for fips code.</a:t>
-            </a:r>
-          </a:p>
-          <a:p>
-            <a:endParaRPr lang="en-US" sz="1200" dirty="0">
-              <a:latin typeface="Calibri" panose="020F0502020204030204" pitchFamily="34" charset="0"/>
-              <a:cs typeface="Calibri" panose="020F0502020204030204" pitchFamily="34" charset="0"/>
+              <a:t>Our Null hypothesis (H0) : The model with no predictor variables fits the data, as well, as the regression model.</a:t>
+            </a:r>
+          </a:p>
+          <a:p>
+            <a:endParaRPr lang="en-US" dirty="0">
+              <a:solidFill>
+                <a:srgbClr val="0070C0"/>
+              </a:solidFill>
             </a:endParaRPr>
           </a:p>
           <a:p>
+            <a:pPr marL="0" marR="0" lvl="0" indent="0" algn="l" defTabSz="914400" rtl="0" eaLnBrk="1" fontAlgn="auto" latinLnBrk="0" hangingPunct="1">
+              <a:lnSpc>
+                <a:spcPct val="100000"/>
+              </a:lnSpc>
+              <a:spcBef>
+                <a:spcPts val="0"/>
+              </a:spcBef>
+              <a:spcAft>
+                <a:spcPts val="0"/>
+              </a:spcAft>
+              <a:buClrTx/>
+              <a:buSzTx/>
+              <a:buFontTx/>
+              <a:buNone/>
+              <a:tabLst/>
+              <a:defRPr/>
+            </a:pPr>
+            <a:r>
+              <a:rPr lang="en-US" dirty="0">
+                <a:solidFill>
+                  <a:srgbClr val="0070C0"/>
+                </a:solidFill>
+              </a:rPr>
+              <a:t>Alternative hypothesis (HA) : Regression model fits the data better than the intercept-only model.</a:t>
+            </a:r>
+          </a:p>
+          <a:p>
+            <a:endParaRPr lang="en-US" dirty="0"/>
+          </a:p>
+          <a:p>
+            <a:endParaRPr lang="en-US" dirty="0"/>
+          </a:p>
+          <a:p>
             <a:r>
               <a:rPr lang="en-US" dirty="0"/>
-              <a:t>Merging three data frames was not easily achievable until common column was thoroughly cleaned.</a:t>
-            </a:r>
+              <a:t>And we accept the alternate hypothesis that our regression model fits the data better than the intercept-only model.</a:t>
+            </a:r>
+          </a:p>
+          <a:p>
+            <a:endParaRPr lang="en-US" dirty="0"/>
+          </a:p>
+          <a:p>
+            <a:r>
+              <a:rPr lang="en-US" dirty="0"/>
+              <a:t>For a given predictor, the t-statistic evaluates whether there is significant association between the predictor and the outcome variable, that is whether the beta coefficient of the predictor is significantly different from zero.</a:t>
+            </a:r>
+          </a:p>
+          <a:p>
+            <a:endParaRPr lang="en-US" dirty="0"/>
+          </a:p>
+          <a:p>
+            <a:r>
+              <a:rPr lang="en-US" dirty="0"/>
+              <a:t>we can see, changing the per_capita_income variable is significantly associated to changes in percent_of_adults_with_a_bachelor_degree_or_higher_2015_19 </a:t>
+            </a:r>
+          </a:p>
+          <a:p>
+            <a:endParaRPr lang="en-US" dirty="0"/>
+          </a:p>
+          <a:p>
+            <a:r>
+              <a:rPr lang="en-US" dirty="0"/>
+              <a:t>For a given predictor variable, the coefficient (b) can be interpreted as the average effect on y of a one unit increase in predictor, holding all other predictors fixed.</a:t>
+            </a:r>
+          </a:p>
+          <a:p>
+            <a:endParaRPr lang="en-US" dirty="0"/>
+          </a:p>
+          <a:p>
+            <a:r>
+              <a:rPr lang="en-US" dirty="0"/>
+              <a:t>One unit increase in per_capita_income will significantly increase percent_of_adults_with_a_bachelor_degree_or_higher_2015_19, holding all other predictors fixed.</a:t>
+            </a:r>
+          </a:p>
+          <a:p>
+            <a:endParaRPr lang="en-US" dirty="0"/>
+          </a:p>
+          <a:p>
+            <a:endParaRPr lang="en-US" dirty="0"/>
           </a:p>
         </p:txBody>
       </p:sp>
@@ -4482,7 +5134,7 @@
           <a:p>
             <a:fld id="{D91607CE-69B0-4DE6-9B29-18F59D9E0C5E}" type="slidenum">
               <a:rPr lang="en-US" smtClean="0"/>
-              <a:t>13</a:t>
+              <a:t>11</a:t>
             </a:fld>
             <a:endParaRPr lang="en-US"/>
           </a:p>
@@ -4491,7 +5143,7 @@
     </p:spTree>
     <p:extLst>
       <p:ext uri="{BB962C8B-B14F-4D97-AF65-F5344CB8AC3E}">
-        <p14:creationId xmlns:p14="http://schemas.microsoft.com/office/powerpoint/2010/main" val="1785557887"/>
+        <p14:creationId xmlns:p14="http://schemas.microsoft.com/office/powerpoint/2010/main" val="1215152824"/>
       </p:ext>
     </p:extLst>
   </p:cSld>
@@ -4652,7 +5304,7 @@
           <a:p>
             <a:fld id="{2F3E8B1C-86EF-43CF-8304-249481088644}" type="datetimeFigureOut">
               <a:rPr lang="en-US" smtClean="0"/>
-              <a:t>5/15/2022</a:t>
+              <a:t>5/16/2022</a:t>
             </a:fld>
             <a:endParaRPr lang="en-US"/>
           </a:p>
@@ -4850,7 +5502,7 @@
           <a:p>
             <a:fld id="{2F3E8B1C-86EF-43CF-8304-249481088644}" type="datetimeFigureOut">
               <a:rPr lang="en-US" smtClean="0"/>
-              <a:t>5/15/2022</a:t>
+              <a:t>5/16/2022</a:t>
             </a:fld>
             <a:endParaRPr lang="en-US"/>
           </a:p>
@@ -5058,7 +5710,7 @@
           <a:p>
             <a:fld id="{2F3E8B1C-86EF-43CF-8304-249481088644}" type="datetimeFigureOut">
               <a:rPr lang="en-US" smtClean="0"/>
-              <a:t>5/15/2022</a:t>
+              <a:t>5/16/2022</a:t>
             </a:fld>
             <a:endParaRPr lang="en-US"/>
           </a:p>
@@ -5256,7 +5908,7 @@
           <a:p>
             <a:fld id="{2F3E8B1C-86EF-43CF-8304-249481088644}" type="datetimeFigureOut">
               <a:rPr lang="en-US" smtClean="0"/>
-              <a:t>5/15/2022</a:t>
+              <a:t>5/16/2022</a:t>
             </a:fld>
             <a:endParaRPr lang="en-US"/>
           </a:p>
@@ -5531,7 +6183,7 @@
           <a:p>
             <a:fld id="{2F3E8B1C-86EF-43CF-8304-249481088644}" type="datetimeFigureOut">
               <a:rPr lang="en-US" smtClean="0"/>
-              <a:t>5/15/2022</a:t>
+              <a:t>5/16/2022</a:t>
             </a:fld>
             <a:endParaRPr lang="en-US"/>
           </a:p>
@@ -5801,7 +6453,7 @@
           <a:p>
             <a:fld id="{2F3E8B1C-86EF-43CF-8304-249481088644}" type="datetimeFigureOut">
               <a:rPr lang="en-US" smtClean="0"/>
-              <a:t>5/15/2022</a:t>
+              <a:t>5/16/2022</a:t>
             </a:fld>
             <a:endParaRPr lang="en-US"/>
           </a:p>
@@ -6221,7 +6873,7 @@
           <a:p>
             <a:fld id="{2F3E8B1C-86EF-43CF-8304-249481088644}" type="datetimeFigureOut">
               <a:rPr lang="en-US" smtClean="0"/>
-              <a:t>5/15/2022</a:t>
+              <a:t>5/16/2022</a:t>
             </a:fld>
             <a:endParaRPr lang="en-US"/>
           </a:p>
@@ -6362,7 +7014,7 @@
           <a:p>
             <a:fld id="{2F3E8B1C-86EF-43CF-8304-249481088644}" type="datetimeFigureOut">
               <a:rPr lang="en-US" smtClean="0"/>
-              <a:t>5/15/2022</a:t>
+              <a:t>5/16/2022</a:t>
             </a:fld>
             <a:endParaRPr lang="en-US"/>
           </a:p>
@@ -6475,7 +7127,7 @@
           <a:p>
             <a:fld id="{2F3E8B1C-86EF-43CF-8304-249481088644}" type="datetimeFigureOut">
               <a:rPr lang="en-US" smtClean="0"/>
-              <a:t>5/15/2022</a:t>
+              <a:t>5/16/2022</a:t>
             </a:fld>
             <a:endParaRPr lang="en-US"/>
           </a:p>
@@ -6786,7 +7438,7 @@
           <a:p>
             <a:fld id="{2F3E8B1C-86EF-43CF-8304-249481088644}" type="datetimeFigureOut">
               <a:rPr lang="en-US" smtClean="0"/>
-              <a:t>5/15/2022</a:t>
+              <a:t>5/16/2022</a:t>
             </a:fld>
             <a:endParaRPr lang="en-US"/>
           </a:p>
@@ -7074,7 +7726,7 @@
           <a:p>
             <a:fld id="{2F3E8B1C-86EF-43CF-8304-249481088644}" type="datetimeFigureOut">
               <a:rPr lang="en-US" smtClean="0"/>
-              <a:t>5/15/2022</a:t>
+              <a:t>5/16/2022</a:t>
             </a:fld>
             <a:endParaRPr lang="en-US"/>
           </a:p>
@@ -7315,7 +7967,7 @@
             <a:fld id="{2F3E8B1C-86EF-43CF-8304-249481088644}" type="datetimeFigureOut">
               <a:rPr lang="en-US" smtClean="0"/>
               <a:pPr/>
-              <a:t>5/15/2022</a:t>
+              <a:t>5/16/2022</a:t>
             </a:fld>
             <a:endParaRPr lang="en-US" dirty="0"/>
           </a:p>
@@ -8436,7 +9088,7 @@
                   <a:srgbClr val="0070C0"/>
                 </a:solidFill>
               </a:rPr>
-              <a:t>b0 + b4*</a:t>
+              <a:t>b0 + b1*</a:t>
             </a:r>
             <a:r>
               <a:rPr lang="en-US" dirty="0" err="1">
@@ -8518,7 +9170,7 @@
                   <a:srgbClr val="0070C0"/>
                 </a:solidFill>
               </a:rPr>
-              <a:t>Alternative hypothesis (HA) : Your regression model fits the data better than the intercept-only model.</a:t>
+              <a:t>Alternative hypothesis (HA) : Regression model fits the data better than the intercept-only model.</a:t>
             </a:r>
           </a:p>
           <a:p>
@@ -9599,7 +10251,7 @@
             <p:ph idx="1"/>
             <p:extLst>
               <p:ext uri="{D42A27DB-BD31-4B8C-83A1-F6EECF244321}">
-                <p14:modId xmlns:p14="http://schemas.microsoft.com/office/powerpoint/2010/main" val="851844633"/>
+                <p14:modId xmlns:p14="http://schemas.microsoft.com/office/powerpoint/2010/main" val="1213090366"/>
               </p:ext>
             </p:extLst>
           </p:nvPr>
@@ -9610,7 +10262,7 @@
         </p:xfrm>
         <a:graphic>
           <a:graphicData uri="http://schemas.openxmlformats.org/drawingml/2006/diagram">
-            <dgm:relIds xmlns:dgm="http://schemas.openxmlformats.org/drawingml/2006/diagram" xmlns:r="http://schemas.openxmlformats.org/officeDocument/2006/relationships" r:dm="rId2" r:lo="rId3" r:qs="rId4" r:cs="rId5"/>
+            <dgm:relIds xmlns:dgm="http://schemas.openxmlformats.org/drawingml/2006/diagram" xmlns:r="http://schemas.openxmlformats.org/officeDocument/2006/relationships" r:dm="rId3" r:lo="rId4" r:qs="rId5" r:cs="rId6"/>
           </a:graphicData>
         </a:graphic>
       </p:graphicFrame>
@@ -10738,7 +11390,7 @@
           </p:nvPr>
         </p:nvPicPr>
         <p:blipFill>
-          <a:blip r:embed="rId2">
+          <a:blip r:embed="rId3">
             <a:extLst>
               <a:ext uri="{28A0092B-C50C-407E-A947-70E740481C1C}">
                 <a14:useLocalDpi xmlns:a14="http://schemas.microsoft.com/office/drawing/2010/main" val="0"/>
@@ -10826,13 +11478,13 @@
           <p:nvPr/>
         </p:nvPicPr>
         <p:blipFill>
-          <a:blip r:embed="rId3">
+          <a:blip r:embed="rId4">
             <a:extLst>
               <a:ext uri="{28A0092B-C50C-407E-A947-70E740481C1C}">
                 <a14:useLocalDpi xmlns:a14="http://schemas.microsoft.com/office/drawing/2010/main" val="0"/>
               </a:ext>
               <a:ext uri="{837473B0-CC2E-450A-ABE3-18F120FF3D39}">
-                <a1611:picAttrSrcUrl xmlns:a1611="http://schemas.microsoft.com/office/drawing/2016/11/main" r:id="rId4"/>
+                <a1611:picAttrSrcUrl xmlns:a1611="http://schemas.microsoft.com/office/drawing/2016/11/main" r:id="rId5"/>
               </a:ext>
             </a:extLst>
           </a:blip>

</xml_diff>

<commit_message>
Scatter plot is updated
</commit_message>
<xml_diff>
--- a/Analysis of Education and Socioeconomic Status.pptx
+++ b/Analysis of Education and Socioeconomic Status.pptx
@@ -3146,7 +3146,7 @@
           <a:p>
             <a:fld id="{4FD92C36-925F-4835-9C0F-AF6483863590}" type="datetimeFigureOut">
               <a:rPr lang="en-US" smtClean="0"/>
-              <a:t>5/16/2022</a:t>
+              <a:t>5/17/2022</a:t>
             </a:fld>
             <a:endParaRPr lang="en-US"/>
           </a:p>
@@ -3459,146 +3459,18 @@
           <a:p>
             <a:r>
               <a:rPr lang="en-US" dirty="0"/>
-              <a:t>Here </a:t>
-            </a:r>
-            <a:r>
-              <a:rPr lang="en-US" b="0" i="0" dirty="0" err="1">
+              <a:t>The topic of my final project is the ‘</a:t>
+            </a:r>
+            <a:r>
+              <a:rPr lang="en-US" dirty="0">
                 <a:solidFill>
-                  <a:srgbClr val="202124"/>
+                  <a:srgbClr val="0070C0"/>
                 </a:solidFill>
-                <a:effectLst/>
-                <a:latin typeface="Google Sans"/>
+                <a:latin typeface="Calibri" panose="020F0502020204030204" pitchFamily="34" charset="0"/>
+                <a:cs typeface="Calibri" panose="020F0502020204030204" pitchFamily="34" charset="0"/>
               </a:rPr>
-              <a:t>tidycensus</a:t>
-            </a:r>
-            <a:r>
-              <a:rPr lang="en-US" b="0" i="0" dirty="0">
-                <a:solidFill>
-                  <a:srgbClr val="202124"/>
-                </a:solidFill>
-                <a:effectLst/>
-                <a:latin typeface="Google Sans"/>
-              </a:rPr>
-              <a:t> library </a:t>
-            </a:r>
-            <a:r>
-              <a:rPr lang="en-US" b="1" i="0" dirty="0">
-                <a:solidFill>
-                  <a:srgbClr val="202124"/>
-                </a:solidFill>
-                <a:effectLst/>
-                <a:latin typeface="Google Sans"/>
-              </a:rPr>
-              <a:t>helped in making the API call to get Census data that is pre-prepared for exploration within the </a:t>
-            </a:r>
-            <a:r>
-              <a:rPr lang="en-US" b="1" i="0" dirty="0" err="1">
-                <a:solidFill>
-                  <a:srgbClr val="202124"/>
-                </a:solidFill>
-                <a:effectLst/>
-                <a:latin typeface="Google Sans"/>
-              </a:rPr>
-              <a:t>tidyverse</a:t>
-            </a:r>
-            <a:r>
-              <a:rPr lang="en-US" b="1" i="0" dirty="0">
-                <a:solidFill>
-                  <a:srgbClr val="202124"/>
-                </a:solidFill>
-                <a:effectLst/>
-                <a:latin typeface="Google Sans"/>
-              </a:rPr>
-              <a:t>.</a:t>
-            </a:r>
-            <a:endParaRPr lang="en-US" dirty="0"/>
-          </a:p>
-          <a:p>
-            <a:r>
-              <a:rPr lang="en-US" dirty="0"/>
-              <a:t>I have used </a:t>
-            </a:r>
-            <a:r>
-              <a:rPr lang="en-US" dirty="0" err="1"/>
-              <a:t>ggPredict</a:t>
-            </a:r>
-            <a:r>
-              <a:rPr lang="en-US" dirty="0"/>
-              <a:t>() function using </a:t>
-            </a:r>
-            <a:r>
-              <a:rPr lang="en-US" dirty="0" err="1"/>
-              <a:t>ggpubr</a:t>
-            </a:r>
-            <a:r>
-              <a:rPr lang="en-US" dirty="0"/>
-              <a:t> library– to Visualize Regression Model and can adjust the number of regression lines with parameter </a:t>
-            </a:r>
-            <a:r>
-              <a:rPr lang="en-US" dirty="0" err="1"/>
-              <a:t>colorn</a:t>
-            </a:r>
-            <a:r>
-              <a:rPr lang="en-US" dirty="0"/>
-              <a:t>. </a:t>
-            </a:r>
-          </a:p>
-          <a:p>
-            <a:r>
-              <a:rPr lang="en-US" b="0" i="0" dirty="0" err="1">
-                <a:solidFill>
-                  <a:srgbClr val="202124"/>
-                </a:solidFill>
-                <a:effectLst/>
-                <a:latin typeface="Roboto" panose="02000000000000000000" pitchFamily="2" charset="0"/>
-              </a:rPr>
-              <a:t>rvest</a:t>
-            </a:r>
-            <a:r>
-              <a:rPr lang="en-US" b="0" i="0" dirty="0">
-                <a:solidFill>
-                  <a:srgbClr val="202124"/>
-                </a:solidFill>
-                <a:effectLst/>
-                <a:latin typeface="Roboto" panose="02000000000000000000" pitchFamily="2" charset="0"/>
-              </a:rPr>
-              <a:t> library </a:t>
-            </a:r>
-            <a:r>
-              <a:rPr lang="en-US" b="1" i="0" dirty="0">
-                <a:solidFill>
-                  <a:srgbClr val="202124"/>
-                </a:solidFill>
-                <a:effectLst/>
-                <a:latin typeface="Roboto" panose="02000000000000000000" pitchFamily="2" charset="0"/>
-              </a:rPr>
-              <a:t>made scraping the data from web pages possible.</a:t>
-            </a:r>
-          </a:p>
-          <a:p>
-            <a:r>
-              <a:rPr lang="en-US" b="1" i="0" dirty="0" err="1">
-                <a:solidFill>
-                  <a:srgbClr val="202124"/>
-                </a:solidFill>
-                <a:effectLst/>
-                <a:latin typeface="Google Sans"/>
-              </a:rPr>
-              <a:t>Dplyrlibrary</a:t>
-            </a:r>
-            <a:r>
-              <a:rPr lang="en-US" b="1" i="0" dirty="0">
-                <a:solidFill>
-                  <a:srgbClr val="202124"/>
-                </a:solidFill>
-                <a:effectLst/>
-                <a:latin typeface="Google Sans"/>
-              </a:rPr>
-              <a:t> helped me solve the data manipulation challenges.</a:t>
-            </a:r>
-            <a:endParaRPr lang="en-US" dirty="0"/>
-          </a:p>
-          <a:p>
+              <a:t>Analysis of Education and Socioeconomic Status’</a:t>
+            </a:r>
             <a:endParaRPr lang="en-US" dirty="0"/>
           </a:p>
         </p:txBody>
@@ -3620,7 +3492,7 @@
           <a:p>
             <a:fld id="{D91607CE-69B0-4DE6-9B29-18F59D9E0C5E}" type="slidenum">
               <a:rPr lang="en-US" smtClean="0"/>
-              <a:t>3</a:t>
+              <a:t>1</a:t>
             </a:fld>
             <a:endParaRPr lang="en-US"/>
           </a:p>
@@ -3629,7 +3501,7 @@
     </p:spTree>
     <p:extLst>
       <p:ext uri="{BB962C8B-B14F-4D97-AF65-F5344CB8AC3E}">
-        <p14:creationId xmlns:p14="http://schemas.microsoft.com/office/powerpoint/2010/main" val="2964892918"/>
+        <p14:creationId xmlns:p14="http://schemas.microsoft.com/office/powerpoint/2010/main" val="39890499"/>
       </p:ext>
     </p:extLst>
   </p:cSld>
@@ -3683,132 +3555,76 @@
           <a:bodyPr/>
           <a:lstStyle/>
           <a:p>
-            <a:r>
-              <a:rPr lang="en-US" b="0" i="0" dirty="0">
-                <a:solidFill>
-                  <a:srgbClr val="202124"/>
-                </a:solidFill>
-                <a:effectLst/>
-                <a:latin typeface="Roboto" panose="02000000000000000000" pitchFamily="2" charset="0"/>
-              </a:rPr>
-              <a:t>Now we will </a:t>
-            </a:r>
-            <a:r>
-              <a:rPr lang="en-US" sz="1200" dirty="0">
-                <a:solidFill>
-                  <a:srgbClr val="0070C0"/>
-                </a:solidFill>
-              </a:rPr>
-              <a:t>analyze the correlation coefficient between the two variables.</a:t>
-            </a:r>
-            <a:endParaRPr lang="en-US" b="0" i="0" dirty="0">
-              <a:solidFill>
-                <a:srgbClr val="202124"/>
-              </a:solidFill>
-              <a:effectLst/>
-              <a:latin typeface="Roboto" panose="02000000000000000000" pitchFamily="2" charset="0"/>
-            </a:endParaRPr>
-          </a:p>
-          <a:p>
-            <a:r>
-              <a:rPr lang="en-US" b="0" i="0" dirty="0">
-                <a:solidFill>
-                  <a:srgbClr val="202124"/>
-                </a:solidFill>
-                <a:effectLst/>
-                <a:latin typeface="Roboto" panose="02000000000000000000" pitchFamily="2" charset="0"/>
-              </a:rPr>
-              <a:t>r is always a number between -1 and 1. </a:t>
-            </a:r>
-            <a:r>
-              <a:rPr lang="en-US" b="1" i="0" dirty="0">
-                <a:solidFill>
-                  <a:srgbClr val="202124"/>
-                </a:solidFill>
-                <a:effectLst/>
-                <a:latin typeface="Roboto" panose="02000000000000000000" pitchFamily="2" charset="0"/>
-              </a:rPr>
-              <a:t>r &gt; 0 indicates a positive association.</a:t>
-            </a:r>
-            <a:r>
-              <a:rPr lang="en-US" b="0" i="0" dirty="0">
-                <a:solidFill>
-                  <a:srgbClr val="202124"/>
-                </a:solidFill>
-                <a:effectLst/>
-                <a:latin typeface="Roboto" panose="02000000000000000000" pitchFamily="2" charset="0"/>
-              </a:rPr>
-              <a:t> </a:t>
-            </a:r>
-            <a:r>
-              <a:rPr lang="en-US" b="1" i="0" dirty="0">
-                <a:solidFill>
-                  <a:srgbClr val="202124"/>
-                </a:solidFill>
-                <a:effectLst/>
-                <a:latin typeface="Roboto" panose="02000000000000000000" pitchFamily="2" charset="0"/>
-              </a:rPr>
-              <a:t>r &lt; 0 indicates a negative association.</a:t>
-            </a:r>
-            <a:r>
-              <a:rPr lang="en-US" b="0" i="0" dirty="0">
-                <a:solidFill>
-                  <a:srgbClr val="202124"/>
-                </a:solidFill>
-                <a:effectLst/>
-                <a:latin typeface="Roboto" panose="02000000000000000000" pitchFamily="2" charset="0"/>
-              </a:rPr>
-              <a:t> </a:t>
-            </a:r>
-            <a:r>
-              <a:rPr lang="en-US" b="1" i="0" dirty="0">
-                <a:solidFill>
-                  <a:srgbClr val="202124"/>
-                </a:solidFill>
-                <a:effectLst/>
-                <a:latin typeface="Roboto" panose="02000000000000000000" pitchFamily="2" charset="0"/>
-              </a:rPr>
-              <a:t>Values of r near 1 indicate a strong linear relationship</a:t>
-            </a:r>
-            <a:r>
-              <a:rPr lang="en-US" b="0" i="0" dirty="0">
-                <a:solidFill>
-                  <a:srgbClr val="202124"/>
-                </a:solidFill>
-                <a:effectLst/>
-                <a:latin typeface="Roboto" panose="02000000000000000000" pitchFamily="2" charset="0"/>
-              </a:rPr>
-              <a:t>.</a:t>
-            </a:r>
-          </a:p>
-          <a:p>
-            <a:r>
-              <a:rPr lang="en-US" b="0" i="0" dirty="0">
-                <a:solidFill>
-                  <a:srgbClr val="202124"/>
-                </a:solidFill>
-                <a:effectLst/>
-                <a:latin typeface="Roboto" panose="02000000000000000000" pitchFamily="2" charset="0"/>
-              </a:rPr>
-              <a:t>In our case, r=0.6 </a:t>
-            </a:r>
-            <a:r>
-              <a:rPr lang="en-US" b="1" i="0" dirty="0">
-                <a:solidFill>
-                  <a:srgbClr val="202124"/>
-                </a:solidFill>
-                <a:effectLst/>
-                <a:latin typeface="Roboto" panose="02000000000000000000" pitchFamily="2" charset="0"/>
-              </a:rPr>
-              <a:t>indicates a strong linear relationship.</a:t>
-            </a:r>
-            <a:endParaRPr lang="en-US" b="0" i="0" dirty="0">
-              <a:solidFill>
-                <a:srgbClr val="202124"/>
-              </a:solidFill>
-              <a:effectLst/>
-              <a:latin typeface="Roboto" panose="02000000000000000000" pitchFamily="2" charset="0"/>
-            </a:endParaRPr>
+            <a:pPr marL="0" marR="0" lvl="0" indent="0" algn="l" defTabSz="914400" rtl="0" eaLnBrk="1" fontAlgn="auto" latinLnBrk="0" hangingPunct="1">
+              <a:lnSpc>
+                <a:spcPct val="100000"/>
+              </a:lnSpc>
+              <a:spcBef>
+                <a:spcPts val="0"/>
+              </a:spcBef>
+              <a:spcAft>
+                <a:spcPts val="0"/>
+              </a:spcAft>
+              <a:buClrTx/>
+              <a:buSzTx/>
+              <a:buFontTx/>
+              <a:buNone/>
+              <a:tabLst/>
+              <a:defRPr/>
+            </a:pPr>
+            <a:r>
+              <a:rPr lang="en-US" dirty="0"/>
+              <a:t>4. And a series of visualization are plotted to check the </a:t>
+            </a:r>
+            <a:r>
+              <a:rPr lang="en-US" sz="1200" dirty="0"/>
+              <a:t>homogeneity of variance. </a:t>
+            </a:r>
+            <a:endParaRPr lang="en-US" dirty="0"/>
+          </a:p>
+          <a:p>
+            <a:endParaRPr lang="en-US" dirty="0"/>
+          </a:p>
+          <a:p>
+            <a:r>
+              <a:rPr lang="en-US" dirty="0"/>
+              <a:t>The red lines representing the mean of the residuals are all basically horizontal and centered around zero. This means there are no outliers or biases in the data that would make a linear regression invalid.</a:t>
+            </a:r>
+          </a:p>
+          <a:p>
+            <a:endParaRPr lang="en-US" dirty="0"/>
+          </a:p>
+          <a:p>
+            <a:r>
+              <a:rPr lang="en-US" dirty="0"/>
+              <a:t>In the Normal Q-</a:t>
+            </a:r>
+            <a:r>
+              <a:rPr lang="en-US" dirty="0" err="1"/>
+              <a:t>Qplot</a:t>
+            </a:r>
+            <a:r>
+              <a:rPr lang="en-US" dirty="0"/>
+              <a:t> in the top right, we can see that the real residuals from our model form an almost perfectly one-to-one line with the theoretical residuals.</a:t>
+            </a:r>
+          </a:p>
+          <a:p>
+            <a:endParaRPr lang="en-US" dirty="0"/>
+          </a:p>
+          <a:p>
+            <a:r>
+              <a:rPr lang="en-US" dirty="0"/>
+              <a:t>Based on these residuals, we can say that our model meets the assumption of homogeneity of variance.</a:t>
+            </a:r>
+          </a:p>
+          <a:p>
+            <a:endParaRPr lang="en-US" dirty="0"/>
+          </a:p>
+          <a:p>
+            <a:r>
+              <a:rPr lang="en-US" dirty="0"/>
+              <a:t>and the appropriate visualizations helps us better understand the data.</a:t>
+            </a:r>
           </a:p>
         </p:txBody>
       </p:sp>
@@ -3829,7 +3645,7 @@
           <a:p>
             <a:fld id="{D91607CE-69B0-4DE6-9B29-18F59D9E0C5E}" type="slidenum">
               <a:rPr lang="en-US" smtClean="0"/>
-              <a:t>12</a:t>
+              <a:t>10</a:t>
             </a:fld>
             <a:endParaRPr lang="en-US"/>
           </a:p>
@@ -3838,7 +3654,7 @@
     </p:spTree>
     <p:extLst>
       <p:ext uri="{BB962C8B-B14F-4D97-AF65-F5344CB8AC3E}">
-        <p14:creationId xmlns:p14="http://schemas.microsoft.com/office/powerpoint/2010/main" val="1327219587"/>
+        <p14:creationId xmlns:p14="http://schemas.microsoft.com/office/powerpoint/2010/main" val="3944038424"/>
       </p:ext>
     </p:extLst>
   </p:cSld>
@@ -3894,23 +3710,525 @@
           <a:p>
             <a:r>
               <a:rPr lang="en-US" dirty="0"/>
-              <a:t>Since I wanted to find the correlation between per capita income and educational attainment, I was considering to scrape the SAT scores of students.</a:t>
+              <a:t>Now the simple linear regression  model is applied and following summary is obtained. </a:t>
             </a:r>
           </a:p>
           <a:p>
             <a:endParaRPr lang="en-US" dirty="0"/>
           </a:p>
           <a:p>
+            <a:pPr marL="0" marR="0" lvl="0" indent="0" algn="l" defTabSz="914400" rtl="0" eaLnBrk="1" fontAlgn="auto" latinLnBrk="0" hangingPunct="1">
+              <a:lnSpc>
+                <a:spcPct val="100000"/>
+              </a:lnSpc>
+              <a:spcBef>
+                <a:spcPts val="0"/>
+              </a:spcBef>
+              <a:spcAft>
+                <a:spcPts val="0"/>
+              </a:spcAft>
+              <a:buClrTx/>
+              <a:buSzTx/>
+              <a:buFontTx/>
+              <a:buNone/>
+              <a:tabLst/>
+              <a:defRPr/>
+            </a:pPr>
             <a:r>
               <a:rPr lang="en-US" dirty="0"/>
-              <a:t>And found out that it is not a user-friendly scrapable site. So, switch to </a:t>
+              <a:t>Here as mentioned earlier, the dependent variable is the ‘</a:t>
+            </a:r>
+            <a:r>
+              <a:rPr lang="en-US" dirty="0" err="1">
+                <a:solidFill>
+                  <a:srgbClr val="0070C0"/>
+                </a:solidFill>
+              </a:rPr>
+              <a:t>percent_of_adults_with_a_bachelors_degree_or_higher</a:t>
+            </a:r>
+            <a:r>
+              <a:rPr lang="en-US" dirty="0">
+                <a:solidFill>
+                  <a:srgbClr val="0070C0"/>
+                </a:solidFill>
+              </a:rPr>
+              <a:t>’ and the independent variable is </a:t>
+            </a:r>
+            <a:r>
+              <a:rPr lang="en-US" dirty="0" err="1">
+                <a:solidFill>
+                  <a:srgbClr val="0070C0"/>
+                </a:solidFill>
+              </a:rPr>
+              <a:t>per_capita_income</a:t>
+            </a:r>
+            <a:endParaRPr lang="en-US" dirty="0"/>
+          </a:p>
+          <a:p>
+            <a:endParaRPr lang="en-US" dirty="0"/>
+          </a:p>
+          <a:p>
+            <a:r>
+              <a:rPr lang="en-US" dirty="0"/>
+              <a:t>Interpretation of the summary:</a:t>
+            </a:r>
+          </a:p>
+          <a:p>
+            <a:endParaRPr lang="en-US" dirty="0"/>
+          </a:p>
+          <a:p>
+            <a:r>
+              <a:rPr lang="en-US" dirty="0"/>
+              <a:t>A large F-statistic will correspond to a statistically significant p-value (p &lt; 0.05). In our example, we can see that the F-statistic equal 62.7 producing a p-value of 5.83e-13, which is highly significant. This means that, the predictor variables is significantly related to the dependent variable.</a:t>
+            </a:r>
+          </a:p>
+          <a:p>
+            <a:endParaRPr lang="en-US" dirty="0"/>
+          </a:p>
+          <a:p>
+            <a:r>
+              <a:rPr lang="en-US" dirty="0">
+                <a:solidFill>
+                  <a:srgbClr val="0070C0"/>
+                </a:solidFill>
+              </a:rPr>
+              <a:t>Our Null hypothesis (H0) : The model with no predictor variables fits the data, as well, as the regression model.</a:t>
+            </a:r>
+          </a:p>
+          <a:p>
+            <a:endParaRPr lang="en-US" dirty="0">
+              <a:solidFill>
+                <a:srgbClr val="0070C0"/>
+              </a:solidFill>
+            </a:endParaRPr>
+          </a:p>
+          <a:p>
+            <a:pPr marL="0" marR="0" lvl="0" indent="0" algn="l" defTabSz="914400" rtl="0" eaLnBrk="1" fontAlgn="auto" latinLnBrk="0" hangingPunct="1">
+              <a:lnSpc>
+                <a:spcPct val="100000"/>
+              </a:lnSpc>
+              <a:spcBef>
+                <a:spcPts val="0"/>
+              </a:spcBef>
+              <a:spcAft>
+                <a:spcPts val="0"/>
+              </a:spcAft>
+              <a:buClrTx/>
+              <a:buSzTx/>
+              <a:buFontTx/>
+              <a:buNone/>
+              <a:tabLst/>
+              <a:defRPr/>
+            </a:pPr>
+            <a:r>
+              <a:rPr lang="en-US" dirty="0">
+                <a:solidFill>
+                  <a:srgbClr val="0070C0"/>
+                </a:solidFill>
+              </a:rPr>
+              <a:t>Alternative hypothesis (HA) : Regression model fits the data better than the intercept-only model.</a:t>
+            </a:r>
+          </a:p>
+          <a:p>
+            <a:endParaRPr lang="en-US" dirty="0"/>
+          </a:p>
+          <a:p>
+            <a:r>
+              <a:rPr lang="en-US" dirty="0"/>
+              <a:t>And we accept the alternate hypothesis that our regression model fits the data better than the intercept-only model.</a:t>
+            </a:r>
+          </a:p>
+          <a:p>
+            <a:endParaRPr lang="en-US" dirty="0"/>
+          </a:p>
+          <a:p>
+            <a:r>
+              <a:rPr lang="en-US" dirty="0"/>
+              <a:t>For a given predictor, the t-statistic evaluates whether there is significant association between the predictor and the outcome variable, that is whether the beta coefficient of the predictor is significantly different from zero.</a:t>
+            </a:r>
+          </a:p>
+          <a:p>
+            <a:endParaRPr lang="en-US" dirty="0"/>
+          </a:p>
+          <a:p>
+            <a:r>
+              <a:rPr lang="en-US" dirty="0"/>
+              <a:t>Thus, the change in per_capita_income variable is significantly associated to change in percent_of_adults_with_a_bachelor_degree_or_higher_2015_19 </a:t>
+            </a:r>
+          </a:p>
+          <a:p>
+            <a:endParaRPr lang="en-US" dirty="0"/>
+          </a:p>
+          <a:p>
+            <a:r>
+              <a:rPr lang="en-US" dirty="0"/>
+              <a:t>For a given predictor variable, the coefficient (b) can be interpreted as the average effect on y of a one unit increase in predictor, holding all other predictors fixed.</a:t>
+            </a:r>
+          </a:p>
+          <a:p>
+            <a:endParaRPr lang="en-US" dirty="0"/>
+          </a:p>
+          <a:p>
+            <a:r>
+              <a:rPr lang="en-US" dirty="0"/>
+              <a:t>One unit increase in per_capita_income will significantly increase percent_of_adults_with_a_bachelor_degree_or_higher_2015_19, holding all other predictors fixed.</a:t>
+            </a:r>
+          </a:p>
+          <a:p>
+            <a:endParaRPr lang="en-US" dirty="0"/>
+          </a:p>
+          <a:p>
+            <a:endParaRPr lang="en-US" dirty="0"/>
+          </a:p>
+        </p:txBody>
+      </p:sp>
+      <p:sp>
+        <p:nvSpPr>
+          <p:cNvPr id="4" name="Slide Number Placeholder 3"/>
+          <p:cNvSpPr>
+            <a:spLocks noGrp="1"/>
+          </p:cNvSpPr>
+          <p:nvPr>
+            <p:ph type="sldNum" sz="quarter" idx="5"/>
+          </p:nvPr>
+        </p:nvSpPr>
+        <p:spPr/>
+        <p:txBody>
+          <a:bodyPr/>
+          <a:lstStyle/>
+          <a:p>
+            <a:fld id="{D91607CE-69B0-4DE6-9B29-18F59D9E0C5E}" type="slidenum">
+              <a:rPr lang="en-US" smtClean="0"/>
+              <a:t>11</a:t>
+            </a:fld>
+            <a:endParaRPr lang="en-US"/>
+          </a:p>
+        </p:txBody>
+      </p:sp>
+    </p:spTree>
+    <p:extLst>
+      <p:ext uri="{BB962C8B-B14F-4D97-AF65-F5344CB8AC3E}">
+        <p14:creationId xmlns:p14="http://schemas.microsoft.com/office/powerpoint/2010/main" val="1215152824"/>
+      </p:ext>
+    </p:extLst>
+  </p:cSld>
+  <p:clrMapOvr>
+    <a:masterClrMapping/>
+  </p:clrMapOvr>
+</p:notes>
+</file>
+
+<file path=ppt/notesSlides/notesSlide12.xml><?xml version="1.0" encoding="utf-8"?>
+<p:notes xmlns:a="http://schemas.openxmlformats.org/drawingml/2006/main" xmlns:r="http://schemas.openxmlformats.org/officeDocument/2006/relationships" xmlns:p="http://schemas.openxmlformats.org/presentationml/2006/main">
+  <p:cSld>
+    <p:spTree>
+      <p:nvGrpSpPr>
+        <p:cNvPr id="1" name=""/>
+        <p:cNvGrpSpPr/>
+        <p:nvPr/>
+      </p:nvGrpSpPr>
+      <p:grpSpPr>
+        <a:xfrm>
+          <a:off x="0" y="0"/>
+          <a:ext cx="0" cy="0"/>
+          <a:chOff x="0" y="0"/>
+          <a:chExt cx="0" cy="0"/>
+        </a:xfrm>
+      </p:grpSpPr>
+      <p:sp>
+        <p:nvSpPr>
+          <p:cNvPr id="2" name="Slide Image Placeholder 1"/>
+          <p:cNvSpPr>
+            <a:spLocks noGrp="1" noRot="1" noChangeAspect="1"/>
+          </p:cNvSpPr>
+          <p:nvPr>
+            <p:ph type="sldImg"/>
+          </p:nvPr>
+        </p:nvSpPr>
+        <p:spPr/>
+      </p:sp>
+      <p:sp>
+        <p:nvSpPr>
+          <p:cNvPr id="3" name="Notes Placeholder 2"/>
+          <p:cNvSpPr>
+            <a:spLocks noGrp="1"/>
+          </p:cNvSpPr>
+          <p:nvPr>
+            <p:ph type="body" idx="1"/>
+          </p:nvPr>
+        </p:nvSpPr>
+        <p:spPr/>
+        <p:txBody>
+          <a:bodyPr/>
+          <a:lstStyle/>
+          <a:p>
+            <a:r>
+              <a:rPr lang="en-US" b="0" i="0" dirty="0">
+                <a:solidFill>
+                  <a:srgbClr val="202124"/>
+                </a:solidFill>
+                <a:effectLst/>
+                <a:latin typeface="Roboto" panose="02000000000000000000" pitchFamily="2" charset="0"/>
+              </a:rPr>
+              <a:t>The </a:t>
+            </a:r>
+            <a:r>
+              <a:rPr lang="en-US" sz="1200" dirty="0">
+                <a:solidFill>
+                  <a:srgbClr val="0070C0"/>
+                </a:solidFill>
+              </a:rPr>
+              <a:t>correlation coefficient between the two variables is </a:t>
+            </a:r>
+            <a:r>
+              <a:rPr lang="en-US" b="0" i="0" dirty="0">
+                <a:solidFill>
+                  <a:srgbClr val="202124"/>
+                </a:solidFill>
+                <a:effectLst/>
+                <a:latin typeface="Roboto" panose="02000000000000000000" pitchFamily="2" charset="0"/>
+              </a:rPr>
+              <a:t>, r=0.6 </a:t>
+            </a:r>
+            <a:r>
+              <a:rPr lang="en-US" b="1" i="0" dirty="0">
+                <a:solidFill>
+                  <a:srgbClr val="202124"/>
+                </a:solidFill>
+                <a:effectLst/>
+                <a:latin typeface="Roboto" panose="02000000000000000000" pitchFamily="2" charset="0"/>
+              </a:rPr>
+              <a:t>indicating a strong linear relationship between per capita income and percent of adult with a bachelor or higher degree </a:t>
+            </a:r>
+            <a:r>
+              <a:rPr lang="en-US" sz="1200" dirty="0">
+                <a:solidFill>
+                  <a:srgbClr val="0070C0"/>
+                </a:solidFill>
+              </a:rPr>
+              <a:t>.</a:t>
+            </a:r>
+          </a:p>
+          <a:p>
+            <a:endParaRPr lang="en-US" b="0" i="0" dirty="0">
+              <a:solidFill>
+                <a:srgbClr val="202124"/>
+              </a:solidFill>
+              <a:effectLst/>
+              <a:latin typeface="Roboto" panose="02000000000000000000" pitchFamily="2" charset="0"/>
+            </a:endParaRPr>
+          </a:p>
+          <a:p>
+            <a:r>
+              <a:rPr lang="en-US" b="0" i="0" dirty="0">
+                <a:solidFill>
+                  <a:srgbClr val="202124"/>
+                </a:solidFill>
+                <a:effectLst/>
+                <a:latin typeface="Roboto" panose="02000000000000000000" pitchFamily="2" charset="0"/>
+              </a:rPr>
+              <a:t>r is always a number between -1 and 1. </a:t>
+            </a:r>
+            <a:r>
+              <a:rPr lang="en-US" b="1" i="0" dirty="0">
+                <a:solidFill>
+                  <a:srgbClr val="202124"/>
+                </a:solidFill>
+                <a:effectLst/>
+                <a:latin typeface="Roboto" panose="02000000000000000000" pitchFamily="2" charset="0"/>
+              </a:rPr>
+              <a:t>r &gt; 0 indicates a positive association.</a:t>
+            </a:r>
+            <a:r>
+              <a:rPr lang="en-US" b="0" i="0" dirty="0">
+                <a:solidFill>
+                  <a:srgbClr val="202124"/>
+                </a:solidFill>
+                <a:effectLst/>
+                <a:latin typeface="Roboto" panose="02000000000000000000" pitchFamily="2" charset="0"/>
+              </a:rPr>
+              <a:t> </a:t>
+            </a:r>
+            <a:r>
+              <a:rPr lang="en-US" b="1" i="0" dirty="0">
+                <a:solidFill>
+                  <a:srgbClr val="202124"/>
+                </a:solidFill>
+                <a:effectLst/>
+                <a:latin typeface="Roboto" panose="02000000000000000000" pitchFamily="2" charset="0"/>
+              </a:rPr>
+              <a:t>r &lt; 0 indicates a negative association.</a:t>
+            </a:r>
+            <a:r>
+              <a:rPr lang="en-US" b="0" i="0" dirty="0">
+                <a:solidFill>
+                  <a:srgbClr val="202124"/>
+                </a:solidFill>
+                <a:effectLst/>
+                <a:latin typeface="Roboto" panose="02000000000000000000" pitchFamily="2" charset="0"/>
+              </a:rPr>
+              <a:t> </a:t>
+            </a:r>
+            <a:r>
+              <a:rPr lang="en-US" b="1" i="0" dirty="0">
+                <a:solidFill>
+                  <a:srgbClr val="202124"/>
+                </a:solidFill>
+                <a:effectLst/>
+                <a:latin typeface="Roboto" panose="02000000000000000000" pitchFamily="2" charset="0"/>
+              </a:rPr>
+              <a:t>Values of r near 1 indicate a strong linear relationship</a:t>
+            </a:r>
+            <a:r>
+              <a:rPr lang="en-US" b="0" i="0" dirty="0">
+                <a:solidFill>
+                  <a:srgbClr val="202124"/>
+                </a:solidFill>
+                <a:effectLst/>
+                <a:latin typeface="Roboto" panose="02000000000000000000" pitchFamily="2" charset="0"/>
+              </a:rPr>
+              <a:t>.</a:t>
+            </a:r>
+          </a:p>
+          <a:p>
+            <a:r>
+              <a:rPr lang="en-US" b="0" i="0" dirty="0">
+                <a:solidFill>
+                  <a:srgbClr val="202124"/>
+                </a:solidFill>
+                <a:effectLst/>
+                <a:latin typeface="Roboto" panose="02000000000000000000" pitchFamily="2" charset="0"/>
+              </a:rPr>
+              <a:t>In our case, r=0.6 </a:t>
+            </a:r>
+            <a:r>
+              <a:rPr lang="en-US" b="1" i="0" dirty="0">
+                <a:solidFill>
+                  <a:srgbClr val="202124"/>
+                </a:solidFill>
+                <a:effectLst/>
+                <a:latin typeface="Roboto" panose="02000000000000000000" pitchFamily="2" charset="0"/>
+              </a:rPr>
+              <a:t>indicates a strong linear relationship.</a:t>
+            </a:r>
+            <a:endParaRPr lang="en-US" b="0" i="0" dirty="0">
+              <a:solidFill>
+                <a:srgbClr val="202124"/>
+              </a:solidFill>
+              <a:effectLst/>
+              <a:latin typeface="Roboto" panose="02000000000000000000" pitchFamily="2" charset="0"/>
+            </a:endParaRPr>
+          </a:p>
+        </p:txBody>
+      </p:sp>
+      <p:sp>
+        <p:nvSpPr>
+          <p:cNvPr id="4" name="Slide Number Placeholder 3"/>
+          <p:cNvSpPr>
+            <a:spLocks noGrp="1"/>
+          </p:cNvSpPr>
+          <p:nvPr>
+            <p:ph type="sldNum" sz="quarter" idx="5"/>
+          </p:nvPr>
+        </p:nvSpPr>
+        <p:spPr/>
+        <p:txBody>
+          <a:bodyPr/>
+          <a:lstStyle/>
+          <a:p>
+            <a:fld id="{D91607CE-69B0-4DE6-9B29-18F59D9E0C5E}" type="slidenum">
+              <a:rPr lang="en-US" smtClean="0"/>
+              <a:t>12</a:t>
+            </a:fld>
+            <a:endParaRPr lang="en-US"/>
+          </a:p>
+        </p:txBody>
+      </p:sp>
+    </p:spTree>
+    <p:extLst>
+      <p:ext uri="{BB962C8B-B14F-4D97-AF65-F5344CB8AC3E}">
+        <p14:creationId xmlns:p14="http://schemas.microsoft.com/office/powerpoint/2010/main" val="1327219587"/>
+      </p:ext>
+    </p:extLst>
+  </p:cSld>
+  <p:clrMapOvr>
+    <a:masterClrMapping/>
+  </p:clrMapOvr>
+</p:notes>
+</file>
+
+<file path=ppt/notesSlides/notesSlide13.xml><?xml version="1.0" encoding="utf-8"?>
+<p:notes xmlns:a="http://schemas.openxmlformats.org/drawingml/2006/main" xmlns:r="http://schemas.openxmlformats.org/officeDocument/2006/relationships" xmlns:p="http://schemas.openxmlformats.org/presentationml/2006/main">
+  <p:cSld>
+    <p:spTree>
+      <p:nvGrpSpPr>
+        <p:cNvPr id="1" name=""/>
+        <p:cNvGrpSpPr/>
+        <p:nvPr/>
+      </p:nvGrpSpPr>
+      <p:grpSpPr>
+        <a:xfrm>
+          <a:off x="0" y="0"/>
+          <a:ext cx="0" cy="0"/>
+          <a:chOff x="0" y="0"/>
+          <a:chExt cx="0" cy="0"/>
+        </a:xfrm>
+      </p:grpSpPr>
+      <p:sp>
+        <p:nvSpPr>
+          <p:cNvPr id="2" name="Slide Image Placeholder 1"/>
+          <p:cNvSpPr>
+            <a:spLocks noGrp="1" noRot="1" noChangeAspect="1"/>
+          </p:cNvSpPr>
+          <p:nvPr>
+            <p:ph type="sldImg"/>
+          </p:nvPr>
+        </p:nvSpPr>
+        <p:spPr/>
+      </p:sp>
+      <p:sp>
+        <p:nvSpPr>
+          <p:cNvPr id="3" name="Notes Placeholder 2"/>
+          <p:cNvSpPr>
+            <a:spLocks noGrp="1"/>
+          </p:cNvSpPr>
+          <p:nvPr>
+            <p:ph type="body" idx="1"/>
+          </p:nvPr>
+        </p:nvSpPr>
+        <p:spPr/>
+        <p:txBody>
+          <a:bodyPr/>
+          <a:lstStyle/>
+          <a:p>
+            <a:r>
+              <a:rPr lang="en-US" dirty="0"/>
+              <a:t>Here are the challenges that I encountered.</a:t>
+            </a:r>
+          </a:p>
+          <a:p>
+            <a:endParaRPr lang="en-US" dirty="0"/>
+          </a:p>
+          <a:p>
+            <a:r>
+              <a:rPr lang="en-US" dirty="0"/>
+              <a:t>Initially, to find the correlation between per capita income and educational attainment, I was considering to scrape the SAT scores of students.</a:t>
+            </a:r>
+          </a:p>
+          <a:p>
+            <a:endParaRPr lang="en-US" dirty="0"/>
+          </a:p>
+          <a:p>
+            <a:r>
+              <a:rPr lang="en-US" dirty="0"/>
+              <a:t>But after trying all possibilities, it becomes clear that it is not a user-friendly scrapable site. So, I switch to </a:t>
             </a:r>
             <a:r>
               <a:rPr lang="en-US" sz="1200" dirty="0">
                 <a:latin typeface="Calibri" panose="020F0502020204030204" pitchFamily="34" charset="0"/>
                 <a:cs typeface="Calibri" panose="020F0502020204030204" pitchFamily="34" charset="0"/>
               </a:rPr>
-              <a:t>'Economic Research Service’ U.S.A site for fetching the education data and performed the we scraping on Wikipedia page for fips code.</a:t>
+              <a:t>'Economic Research Service’ USDA site for fetching the education data..</a:t>
             </a:r>
           </a:p>
           <a:p>
@@ -3922,7 +4240,7 @@
           <a:p>
             <a:r>
               <a:rPr lang="en-US" dirty="0"/>
-              <a:t>Merging three data frames was not easily achievable until common column was thoroughly cleaned.</a:t>
+              <a:t>Merging three data frames was not easily achievable until I figured out that the common column had hidden spaces which were creating a mismatch, so it was thoroughly cleaned.</a:t>
             </a:r>
           </a:p>
         </p:txBody>
@@ -4007,12 +4325,6 @@
           <a:bodyPr/>
           <a:lstStyle/>
           <a:p>
-            <a:r>
-              <a:rPr lang="en-US" dirty="0"/>
-              <a:t>I have fetched the data from three data sources.</a:t>
-            </a:r>
-          </a:p>
-          <a:p>
             <a:pPr marL="0" marR="0" lvl="0" indent="0" algn="l" defTabSz="914400" rtl="0" eaLnBrk="1" fontAlgn="auto" latinLnBrk="0" hangingPunct="1">
               <a:lnSpc>
                 <a:spcPct val="100000"/>
@@ -4032,77 +4344,15 @@
             </a:pPr>
             <a:r>
               <a:rPr lang="en-US" dirty="0"/>
-              <a:t>After performing the exploratory data analysis and thoroughly cleaning the data during the ETL process, designed a relational database.</a:t>
-            </a:r>
-          </a:p>
-          <a:p>
-            <a:pPr marL="0" marR="0" lvl="0" indent="0" algn="l" defTabSz="914400" rtl="0" eaLnBrk="1" fontAlgn="auto" latinLnBrk="0" hangingPunct="1">
-              <a:lnSpc>
-                <a:spcPct val="100000"/>
-              </a:lnSpc>
-              <a:spcBef>
-                <a:spcPts val="0"/>
-              </a:spcBef>
-              <a:spcAft>
-                <a:spcPts val="0"/>
-              </a:spcAft>
-              <a:buClrTx/>
-              <a:buSzTx/>
-              <a:buFontTx/>
-              <a:buNone/>
-              <a:tabLst/>
-              <a:defRPr/>
-            </a:pPr>
-            <a:r>
-              <a:rPr lang="en-US" dirty="0"/>
-              <a:t>Then applied the Linear regression model to find the correlation between the variables.</a:t>
-            </a:r>
-          </a:p>
-          <a:p>
-            <a:pPr marL="0" marR="0" lvl="0" indent="0" algn="l" defTabSz="914400" rtl="0" eaLnBrk="1" fontAlgn="auto" latinLnBrk="0" hangingPunct="1">
-              <a:lnSpc>
-                <a:spcPct val="100000"/>
-              </a:lnSpc>
-              <a:spcBef>
-                <a:spcPts val="0"/>
-              </a:spcBef>
-              <a:spcAft>
-                <a:spcPts val="0"/>
-              </a:spcAft>
-              <a:buClrTx/>
-              <a:buSzTx/>
-              <a:buFontTx/>
-              <a:buNone/>
-              <a:tabLst/>
-              <a:defRPr/>
-            </a:pPr>
-            <a:r>
-              <a:rPr lang="en-US" dirty="0"/>
-              <a:t>And finally interpret the results.</a:t>
-            </a:r>
-          </a:p>
-          <a:p>
-            <a:pPr marL="0" marR="0" lvl="0" indent="0" algn="l" defTabSz="914400" rtl="0" eaLnBrk="1" fontAlgn="auto" latinLnBrk="0" hangingPunct="1">
-              <a:lnSpc>
-                <a:spcPct val="100000"/>
-              </a:lnSpc>
-              <a:spcBef>
-                <a:spcPts val="0"/>
-              </a:spcBef>
-              <a:spcAft>
-                <a:spcPts val="0"/>
-              </a:spcAft>
-              <a:buClrTx/>
-              <a:buSzTx/>
-              <a:buFontTx/>
-              <a:buNone/>
-              <a:tabLst/>
-              <a:defRPr/>
-            </a:pPr>
-            <a:endParaRPr lang="en-US" dirty="0"/>
-          </a:p>
-          <a:p>
-            <a:endParaRPr lang="en-US" dirty="0"/>
+              <a:t>The motivation for performing this analysis is an article on ‘</a:t>
+            </a:r>
+            <a:r>
+              <a:rPr lang="en-US" sz="1200" dirty="0">
+                <a:latin typeface="Calibri" panose="020F0502020204030204" pitchFamily="34" charset="0"/>
+                <a:cs typeface="Calibri" panose="020F0502020204030204" pitchFamily="34" charset="0"/>
+              </a:rPr>
+              <a:t>Education and Socioeconomic Status’ and the link is provided here.</a:t>
+            </a:r>
           </a:p>
         </p:txBody>
       </p:sp>
@@ -4123,7 +4373,7 @@
           <a:p>
             <a:fld id="{D91607CE-69B0-4DE6-9B29-18F59D9E0C5E}" type="slidenum">
               <a:rPr lang="en-US" smtClean="0"/>
-              <a:t>4</a:t>
+              <a:t>2</a:t>
             </a:fld>
             <a:endParaRPr lang="en-US"/>
           </a:p>
@@ -4132,7 +4382,7 @@
     </p:spTree>
     <p:extLst>
       <p:ext uri="{BB962C8B-B14F-4D97-AF65-F5344CB8AC3E}">
-        <p14:creationId xmlns:p14="http://schemas.microsoft.com/office/powerpoint/2010/main" val="2711217439"/>
+        <p14:creationId xmlns:p14="http://schemas.microsoft.com/office/powerpoint/2010/main" val="1829216643"/>
       </p:ext>
     </p:extLst>
   </p:cSld>
@@ -4186,85 +4436,163 @@
           <a:bodyPr/>
           <a:lstStyle/>
           <a:p>
+            <a:pPr marL="0" indent="0">
+              <a:buNone/>
+            </a:pPr>
             <a:r>
               <a:rPr lang="en-US" dirty="0"/>
-              <a:t>When performing the web scraping from Wikipedia, the html source code is generated by calling the </a:t>
+              <a:t>The goal is to evaluate </a:t>
+            </a:r>
+            <a:r>
+              <a:rPr lang="en-US" sz="1200" dirty="0">
+                <a:latin typeface="Calibri" panose="020F0502020204030204" pitchFamily="34" charset="0"/>
+                <a:cs typeface="Calibri" panose="020F0502020204030204" pitchFamily="34" charset="0"/>
+              </a:rPr>
+              <a:t>the impact of per capita income on educational attainment.</a:t>
+            </a:r>
+          </a:p>
+          <a:p>
+            <a:r>
+              <a:rPr lang="en-US" dirty="0"/>
+              <a:t>And the libraries that I are used are as mentioned.</a:t>
+            </a:r>
+          </a:p>
+          <a:p>
+            <a:r>
+              <a:rPr lang="en-US" dirty="0"/>
+              <a:t>Here </a:t>
+            </a:r>
+            <a:r>
+              <a:rPr lang="en-US" b="0" i="0" dirty="0" err="1">
+                <a:solidFill>
+                  <a:srgbClr val="202124"/>
+                </a:solidFill>
+                <a:effectLst/>
+                <a:latin typeface="Google Sans"/>
+              </a:rPr>
+              <a:t>tidycensus</a:t>
+            </a:r>
+            <a:r>
+              <a:rPr lang="en-US" b="0" i="0" dirty="0">
+                <a:solidFill>
+                  <a:srgbClr val="202124"/>
+                </a:solidFill>
+                <a:effectLst/>
+                <a:latin typeface="Google Sans"/>
+              </a:rPr>
+              <a:t> library </a:t>
+            </a:r>
+            <a:r>
+              <a:rPr lang="en-US" b="1" i="0" dirty="0">
+                <a:solidFill>
+                  <a:srgbClr val="202124"/>
+                </a:solidFill>
+                <a:effectLst/>
+                <a:latin typeface="Google Sans"/>
+              </a:rPr>
+              <a:t>helped in making an API call to get Census data that is pre-prepared for exploration within the </a:t>
+            </a:r>
+            <a:r>
+              <a:rPr lang="en-US" b="1" i="0" dirty="0" err="1">
+                <a:solidFill>
+                  <a:srgbClr val="202124"/>
+                </a:solidFill>
+                <a:effectLst/>
+                <a:latin typeface="Google Sans"/>
+              </a:rPr>
+              <a:t>tidyverse</a:t>
+            </a:r>
+            <a:r>
+              <a:rPr lang="en-US" b="1" i="0" dirty="0">
+                <a:solidFill>
+                  <a:srgbClr val="202124"/>
+                </a:solidFill>
+                <a:effectLst/>
+                <a:latin typeface="Google Sans"/>
+              </a:rPr>
+              <a:t>.</a:t>
+            </a:r>
+            <a:endParaRPr lang="en-US" dirty="0"/>
+          </a:p>
+          <a:p>
+            <a:r>
+              <a:rPr lang="en-US" dirty="0"/>
+              <a:t>I have used </a:t>
             </a:r>
             <a:r>
               <a:rPr lang="en-US" dirty="0" err="1"/>
-              <a:t>read_html</a:t>
+              <a:t>ggPredict</a:t>
             </a:r>
             <a:r>
               <a:rPr lang="en-US" dirty="0"/>
-              <a:t> function.</a:t>
-            </a:r>
-          </a:p>
-          <a:p>
+              <a:t>() function using </a:t>
+            </a:r>
+            <a:r>
+              <a:rPr lang="en-US" dirty="0" err="1"/>
+              <a:t>ggpubr</a:t>
+            </a:r>
+            <a:r>
+              <a:rPr lang="en-US" dirty="0"/>
+              <a:t> library– to Visualize the Regression Model. </a:t>
+            </a:r>
+          </a:p>
+          <a:p>
+            <a:r>
+              <a:rPr lang="en-US" b="0" i="0" dirty="0" err="1">
+                <a:solidFill>
+                  <a:srgbClr val="202124"/>
+                </a:solidFill>
+                <a:effectLst/>
+                <a:latin typeface="Roboto" panose="02000000000000000000" pitchFamily="2" charset="0"/>
+              </a:rPr>
+              <a:t>rvest</a:t>
+            </a:r>
+            <a:r>
+              <a:rPr lang="en-US" b="0" i="0" dirty="0">
+                <a:solidFill>
+                  <a:srgbClr val="202124"/>
+                </a:solidFill>
+                <a:effectLst/>
+                <a:latin typeface="Roboto" panose="02000000000000000000" pitchFamily="2" charset="0"/>
+              </a:rPr>
+              <a:t> library </a:t>
+            </a:r>
+            <a:r>
+              <a:rPr lang="en-US" b="1" i="0" dirty="0">
+                <a:solidFill>
+                  <a:srgbClr val="202124"/>
+                </a:solidFill>
+                <a:effectLst/>
+                <a:latin typeface="Roboto" panose="02000000000000000000" pitchFamily="2" charset="0"/>
+              </a:rPr>
+              <a:t>made scraping of the data from web pages possible.</a:t>
+            </a:r>
+          </a:p>
+          <a:p>
+            <a:r>
+              <a:rPr lang="en-US" b="1" i="0" dirty="0" err="1">
+                <a:solidFill>
+                  <a:srgbClr val="202124"/>
+                </a:solidFill>
+                <a:effectLst/>
+                <a:latin typeface="Google Sans"/>
+              </a:rPr>
+              <a:t>Dplyr</a:t>
+            </a:r>
+            <a:r>
+              <a:rPr lang="en-US" b="1" i="0" dirty="0">
+                <a:solidFill>
+                  <a:srgbClr val="202124"/>
+                </a:solidFill>
+                <a:effectLst/>
+                <a:latin typeface="Google Sans"/>
+              </a:rPr>
+              <a:t> library helped me solve the data manipulation challenges.</a:t>
+            </a:r>
             <a:endParaRPr lang="en-US" dirty="0"/>
           </a:p>
           <a:p>
-            <a:r>
-              <a:rPr lang="en-US" dirty="0"/>
-              <a:t>I used </a:t>
-            </a:r>
-            <a:r>
-              <a:rPr lang="en-US" dirty="0" err="1"/>
-              <a:t>html_nodes</a:t>
-            </a:r>
-            <a:r>
-              <a:rPr lang="en-US" dirty="0"/>
-              <a:t> function using CSS Selector and generated a table using </a:t>
-            </a:r>
-            <a:r>
-              <a:rPr lang="en-US" dirty="0" err="1"/>
-              <a:t>html_table</a:t>
-            </a:r>
-            <a:r>
-              <a:rPr lang="en-US" dirty="0"/>
-              <a:t> function.</a:t>
-            </a:r>
-          </a:p>
-          <a:p>
             <a:endParaRPr lang="en-US" dirty="0"/>
-          </a:p>
-          <a:p>
-            <a:r>
-              <a:rPr lang="en-US" dirty="0"/>
-              <a:t>Next, I access the Census API key, save it in the environmental variable  and fetched the Census Data for the year 2020.</a:t>
-            </a:r>
-          </a:p>
-          <a:p>
-            <a:endParaRPr lang="en-US" dirty="0"/>
-          </a:p>
-          <a:p>
-            <a:r>
-              <a:rPr lang="en-US" dirty="0"/>
-              <a:t>And lastly, after downloading the csv file from the </a:t>
-            </a:r>
-            <a:r>
-              <a:rPr lang="en-US" dirty="0" err="1"/>
-              <a:t>USDept</a:t>
-            </a:r>
-            <a:r>
-              <a:rPr lang="en-US" dirty="0"/>
-              <a:t>. of Agriculture, I imported the raw data into the </a:t>
-            </a:r>
-            <a:r>
-              <a:rPr lang="en-US" dirty="0" err="1"/>
-              <a:t>Rmd</a:t>
-            </a:r>
-            <a:r>
-              <a:rPr lang="en-US" dirty="0"/>
-              <a:t> file from </a:t>
-            </a:r>
-            <a:r>
-              <a:rPr lang="en-US" dirty="0" err="1"/>
-              <a:t>Github</a:t>
-            </a:r>
-            <a:r>
-              <a:rPr lang="en-US" dirty="0"/>
-              <a:t>.</a:t>
-            </a:r>
           </a:p>
         </p:txBody>
       </p:sp>
@@ -4285,7 +4613,7 @@
           <a:p>
             <a:fld id="{D91607CE-69B0-4DE6-9B29-18F59D9E0C5E}" type="slidenum">
               <a:rPr lang="en-US" smtClean="0"/>
-              <a:t>5</a:t>
+              <a:t>3</a:t>
             </a:fld>
             <a:endParaRPr lang="en-US"/>
           </a:p>
@@ -4294,7 +4622,7 @@
     </p:spTree>
     <p:extLst>
       <p:ext uri="{BB962C8B-B14F-4D97-AF65-F5344CB8AC3E}">
-        <p14:creationId xmlns:p14="http://schemas.microsoft.com/office/powerpoint/2010/main" val="417447011"/>
+        <p14:creationId xmlns:p14="http://schemas.microsoft.com/office/powerpoint/2010/main" val="2964892918"/>
       </p:ext>
     </p:extLst>
   </p:cSld>
@@ -4350,95 +4678,99 @@
           <a:p>
             <a:r>
               <a:rPr lang="en-US" dirty="0"/>
-              <a:t>Now my three </a:t>
-            </a:r>
-            <a:r>
-              <a:rPr lang="en-US" sz="1200" dirty="0" err="1">
-                <a:latin typeface="Calibri" panose="020F0502020204030204" pitchFamily="34" charset="0"/>
-                <a:cs typeface="Calibri" panose="020F0502020204030204" pitchFamily="34" charset="0"/>
-              </a:rPr>
-              <a:t>dataframes</a:t>
-            </a:r>
-            <a:r>
-              <a:rPr lang="en-US" sz="1200" dirty="0">
-                <a:latin typeface="Calibri" panose="020F0502020204030204" pitchFamily="34" charset="0"/>
-                <a:cs typeface="Calibri" panose="020F0502020204030204" pitchFamily="34" charset="0"/>
-              </a:rPr>
-              <a:t> are ready to be cleaned.</a:t>
-            </a:r>
-          </a:p>
-          <a:p>
-            <a:endParaRPr lang="en-US" sz="1200" dirty="0">
-              <a:latin typeface="Calibri" panose="020F0502020204030204" pitchFamily="34" charset="0"/>
-              <a:cs typeface="Calibri" panose="020F0502020204030204" pitchFamily="34" charset="0"/>
-            </a:endParaRPr>
-          </a:p>
-          <a:p>
-            <a:r>
-              <a:rPr lang="en-US" sz="1200" dirty="0">
-                <a:latin typeface="Calibri" panose="020F0502020204030204" pitchFamily="34" charset="0"/>
-                <a:cs typeface="Calibri" panose="020F0502020204030204" pitchFamily="34" charset="0"/>
-              </a:rPr>
-              <a:t>For that I performed the following mentioned operations.</a:t>
-            </a:r>
-          </a:p>
-          <a:p>
-            <a:endParaRPr lang="en-US" sz="1200" dirty="0">
-              <a:latin typeface="Calibri" panose="020F0502020204030204" pitchFamily="34" charset="0"/>
-              <a:cs typeface="Calibri" panose="020F0502020204030204" pitchFamily="34" charset="0"/>
-            </a:endParaRPr>
-          </a:p>
-          <a:p>
-            <a:r>
-              <a:rPr lang="en-US" sz="1200" dirty="0">
-                <a:latin typeface="Calibri" panose="020F0502020204030204" pitchFamily="34" charset="0"/>
-                <a:cs typeface="Calibri" panose="020F0502020204030204" pitchFamily="34" charset="0"/>
-              </a:rPr>
-              <a:t>Also, exported the three files as CSV to the working directory for designing the relational database.</a:t>
-            </a:r>
-          </a:p>
-          <a:p>
-            <a:endParaRPr lang="en-US" sz="1200" dirty="0">
-              <a:latin typeface="Calibri" panose="020F0502020204030204" pitchFamily="34" charset="0"/>
-              <a:cs typeface="Calibri" panose="020F0502020204030204" pitchFamily="34" charset="0"/>
-            </a:endParaRPr>
-          </a:p>
-          <a:p>
-            <a:r>
-              <a:rPr lang="en-US" sz="1200" dirty="0">
-                <a:latin typeface="Calibri" panose="020F0502020204030204" pitchFamily="34" charset="0"/>
-                <a:cs typeface="Calibri" panose="020F0502020204030204" pitchFamily="34" charset="0"/>
-              </a:rPr>
-              <a:t>And finally, merging the three </a:t>
-            </a:r>
-            <a:r>
-              <a:rPr lang="en-US" sz="1200" dirty="0" err="1">
-                <a:latin typeface="Calibri" panose="020F0502020204030204" pitchFamily="34" charset="0"/>
-                <a:cs typeface="Calibri" panose="020F0502020204030204" pitchFamily="34" charset="0"/>
-              </a:rPr>
-              <a:t>datframes</a:t>
-            </a:r>
-            <a:r>
-              <a:rPr lang="en-US" sz="1200" dirty="0">
-                <a:latin typeface="Calibri" panose="020F0502020204030204" pitchFamily="34" charset="0"/>
-                <a:cs typeface="Calibri" panose="020F0502020204030204" pitchFamily="34" charset="0"/>
-              </a:rPr>
-              <a:t> into new </a:t>
-            </a:r>
-            <a:r>
-              <a:rPr lang="en-US" sz="1200" dirty="0" err="1">
-                <a:latin typeface="Calibri" panose="020F0502020204030204" pitchFamily="34" charset="0"/>
-                <a:cs typeface="Calibri" panose="020F0502020204030204" pitchFamily="34" charset="0"/>
-              </a:rPr>
-              <a:t>dataframe</a:t>
-            </a:r>
-            <a:r>
-              <a:rPr lang="en-US" sz="1200" dirty="0">
-                <a:latin typeface="Calibri" panose="020F0502020204030204" pitchFamily="34" charset="0"/>
-                <a:cs typeface="Calibri" panose="020F0502020204030204" pitchFamily="34" charset="0"/>
-              </a:rPr>
-              <a:t> to investigate the impact of per capita income on education.</a:t>
-            </a:r>
+              <a:t>Now steps to achieve the goal are that I first fetched the data from three data sources.</a:t>
+            </a:r>
+          </a:p>
+          <a:p>
+            <a:pPr marL="0" marR="0" lvl="0" indent="0" algn="l" defTabSz="914400" rtl="0" eaLnBrk="1" fontAlgn="auto" latinLnBrk="0" hangingPunct="1">
+              <a:lnSpc>
+                <a:spcPct val="100000"/>
+              </a:lnSpc>
+              <a:spcBef>
+                <a:spcPts val="0"/>
+              </a:spcBef>
+              <a:spcAft>
+                <a:spcPts val="0"/>
+              </a:spcAft>
+              <a:buClrTx/>
+              <a:buSzTx/>
+              <a:buFontTx/>
+              <a:buNone/>
+              <a:tabLst/>
+              <a:defRPr/>
+            </a:pPr>
+            <a:r>
+              <a:rPr lang="en-US" dirty="0"/>
+              <a:t>After performing the exploratory data analysis(EDA) and thoroughly cleaning the data during the extract load and transform(ETL) process, I designed a relational database.</a:t>
+            </a:r>
+          </a:p>
+          <a:p>
+            <a:pPr marL="0" marR="0" lvl="0" indent="0" algn="l" defTabSz="914400" rtl="0" eaLnBrk="1" fontAlgn="auto" latinLnBrk="0" hangingPunct="1">
+              <a:lnSpc>
+                <a:spcPct val="100000"/>
+              </a:lnSpc>
+              <a:spcBef>
+                <a:spcPts val="0"/>
+              </a:spcBef>
+              <a:spcAft>
+                <a:spcPts val="0"/>
+              </a:spcAft>
+              <a:buClrTx/>
+              <a:buSzTx/>
+              <a:buFontTx/>
+              <a:buNone/>
+              <a:tabLst/>
+              <a:defRPr/>
+            </a:pPr>
+            <a:r>
+              <a:rPr lang="en-US" dirty="0"/>
+              <a:t>Then I applied the Linear regression model to the merged dataset to find out the correlation between the variables.</a:t>
+            </a:r>
+          </a:p>
+          <a:p>
+            <a:pPr marL="0" marR="0" lvl="0" indent="0" algn="l" defTabSz="914400" rtl="0" eaLnBrk="1" fontAlgn="auto" latinLnBrk="0" hangingPunct="1">
+              <a:lnSpc>
+                <a:spcPct val="100000"/>
+              </a:lnSpc>
+              <a:spcBef>
+                <a:spcPts val="0"/>
+              </a:spcBef>
+              <a:spcAft>
+                <a:spcPts val="0"/>
+              </a:spcAft>
+              <a:buClrTx/>
+              <a:buSzTx/>
+              <a:buFontTx/>
+              <a:buNone/>
+              <a:tabLst/>
+              <a:defRPr/>
+            </a:pPr>
+            <a:r>
+              <a:rPr lang="en-US" dirty="0"/>
+              <a:t>And finally, I interpreted the results.</a:t>
+            </a:r>
+          </a:p>
+          <a:p>
+            <a:pPr marL="0" marR="0" lvl="0" indent="0" algn="l" defTabSz="914400" rtl="0" eaLnBrk="1" fontAlgn="auto" latinLnBrk="0" hangingPunct="1">
+              <a:lnSpc>
+                <a:spcPct val="100000"/>
+              </a:lnSpc>
+              <a:spcBef>
+                <a:spcPts val="0"/>
+              </a:spcBef>
+              <a:spcAft>
+                <a:spcPts val="0"/>
+              </a:spcAft>
+              <a:buClrTx/>
+              <a:buSzTx/>
+              <a:buFontTx/>
+              <a:buNone/>
+              <a:tabLst/>
+              <a:defRPr/>
+            </a:pPr>
+            <a:endParaRPr lang="en-US" dirty="0"/>
+          </a:p>
+          <a:p>
             <a:endParaRPr lang="en-US" dirty="0"/>
           </a:p>
         </p:txBody>
@@ -4460,7 +4792,7 @@
           <a:p>
             <a:fld id="{D91607CE-69B0-4DE6-9B29-18F59D9E0C5E}" type="slidenum">
               <a:rPr lang="en-US" smtClean="0"/>
-              <a:t>6</a:t>
+              <a:t>4</a:t>
             </a:fld>
             <a:endParaRPr lang="en-US"/>
           </a:p>
@@ -4469,7 +4801,7 @@
     </p:spTree>
     <p:extLst>
       <p:ext uri="{BB962C8B-B14F-4D97-AF65-F5344CB8AC3E}">
-        <p14:creationId xmlns:p14="http://schemas.microsoft.com/office/powerpoint/2010/main" val="1906942562"/>
+        <p14:creationId xmlns:p14="http://schemas.microsoft.com/office/powerpoint/2010/main" val="2711217439"/>
       </p:ext>
     </p:extLst>
   </p:cSld>
@@ -4525,13 +4857,93 @@
           <a:p>
             <a:r>
               <a:rPr lang="en-US" dirty="0"/>
-              <a:t>Here is the relational database design performed using the tool Quick DBD</a:t>
-            </a:r>
-          </a:p>
-          <a:p>
+              <a:t>All my three data sets are at US county level. When performing the web scraping from Wikipedia page for the </a:t>
+            </a:r>
+            <a:r>
+              <a:rPr lang="en-US" dirty="0" err="1"/>
+              <a:t>fips</a:t>
+            </a:r>
             <a:r>
               <a:rPr lang="en-US" dirty="0"/>
-              <a:t>And the CSVs are ready to be imported into PostgreSQL database.</a:t>
+              <a:t> code data, the html source code is generated by calling the </a:t>
+            </a:r>
+            <a:r>
+              <a:rPr lang="en-US" dirty="0" err="1"/>
+              <a:t>read_html</a:t>
+            </a:r>
+            <a:r>
+              <a:rPr lang="en-US" dirty="0"/>
+              <a:t> function.</a:t>
+            </a:r>
+          </a:p>
+          <a:p>
+            <a:endParaRPr lang="en-US" dirty="0"/>
+          </a:p>
+          <a:p>
+            <a:r>
+              <a:rPr lang="en-US" dirty="0"/>
+              <a:t>I used </a:t>
+            </a:r>
+            <a:r>
+              <a:rPr lang="en-US" dirty="0" err="1"/>
+              <a:t>html_nodes</a:t>
+            </a:r>
+            <a:r>
+              <a:rPr lang="en-US" dirty="0"/>
+              <a:t> function using CSS Selector and generated a table using </a:t>
+            </a:r>
+            <a:r>
+              <a:rPr lang="en-US" dirty="0" err="1"/>
+              <a:t>html_table</a:t>
+            </a:r>
+            <a:r>
+              <a:rPr lang="en-US" dirty="0"/>
+              <a:t> function.</a:t>
+            </a:r>
+          </a:p>
+          <a:p>
+            <a:endParaRPr lang="en-US" dirty="0"/>
+          </a:p>
+          <a:p>
+            <a:r>
+              <a:rPr lang="en-US" dirty="0"/>
+              <a:t>Next, I access the Census API key, save it in the environmental variable  and fetched the Census Data for the year 2020.</a:t>
+            </a:r>
+          </a:p>
+          <a:p>
+            <a:endParaRPr lang="en-US" dirty="0"/>
+          </a:p>
+          <a:p>
+            <a:r>
+              <a:rPr lang="en-US" dirty="0"/>
+              <a:t>And lastly, after downloading the education data csv file from the </a:t>
+            </a:r>
+            <a:r>
+              <a:rPr lang="en-US" sz="1200" dirty="0">
+                <a:latin typeface="Calibri" panose="020F0502020204030204" pitchFamily="34" charset="0"/>
+                <a:cs typeface="Calibri" panose="020F0502020204030204" pitchFamily="34" charset="0"/>
+              </a:rPr>
+              <a:t>'Economic Research Service, USD</a:t>
+            </a:r>
+            <a:r>
+              <a:rPr lang="en-US" dirty="0"/>
+              <a:t>A, I pushed it on </a:t>
+            </a:r>
+            <a:r>
+              <a:rPr lang="en-US" dirty="0" err="1"/>
+              <a:t>Github</a:t>
+            </a:r>
+            <a:r>
+              <a:rPr lang="en-US" dirty="0"/>
+              <a:t>, and imported the raw data into the </a:t>
+            </a:r>
+            <a:r>
+              <a:rPr lang="en-US" dirty="0" err="1"/>
+              <a:t>Rmd</a:t>
+            </a:r>
+            <a:r>
+              <a:rPr lang="en-US" dirty="0"/>
+              <a:t> file.</a:t>
             </a:r>
           </a:p>
         </p:txBody>
@@ -4553,7 +4965,7 @@
           <a:p>
             <a:fld id="{D91607CE-69B0-4DE6-9B29-18F59D9E0C5E}" type="slidenum">
               <a:rPr lang="en-US" smtClean="0"/>
-              <a:t>7</a:t>
+              <a:t>5</a:t>
             </a:fld>
             <a:endParaRPr lang="en-US"/>
           </a:p>
@@ -4562,7 +4974,7 @@
     </p:spTree>
     <p:extLst>
       <p:ext uri="{BB962C8B-B14F-4D97-AF65-F5344CB8AC3E}">
-        <p14:creationId xmlns:p14="http://schemas.microsoft.com/office/powerpoint/2010/main" val="3034812331"/>
+        <p14:creationId xmlns:p14="http://schemas.microsoft.com/office/powerpoint/2010/main" val="417447011"/>
       </p:ext>
     </p:extLst>
   </p:cSld>
@@ -4618,54 +5030,59 @@
           <a:p>
             <a:r>
               <a:rPr lang="en-US" dirty="0"/>
-              <a:t>Before applying the linear regression model, the following four assumption must be made. And it is important to visualize the data based on these assumption.</a:t>
-            </a:r>
-          </a:p>
-          <a:p>
-            <a:endParaRPr lang="en-US" dirty="0"/>
-          </a:p>
-          <a:p>
-            <a:pPr marL="228600" indent="-228600">
-              <a:buAutoNum type="arabicPeriod"/>
-            </a:pPr>
-            <a:r>
-              <a:rPr lang="en-US" sz="1200" dirty="0"/>
-              <a:t>For the Independence of observations : </a:t>
-            </a:r>
-            <a:r>
-              <a:rPr lang="en-US" dirty="0"/>
-              <a:t>Since there is only one independent variable and one dependent variable, we don’t need to test for any hidden relationships among variables.</a:t>
-            </a:r>
-          </a:p>
-          <a:p>
-            <a:pPr marL="228600" indent="-228600">
-              <a:buAutoNum type="arabicPeriod"/>
-            </a:pPr>
-            <a:endParaRPr lang="en-US" dirty="0"/>
-          </a:p>
-          <a:p>
-            <a:r>
-              <a:rPr lang="en-US" dirty="0"/>
-              <a:t>2. The normality can be checked by using the hist() function, which tells whether the dependent variable follows a normal distribution or not.</a:t>
-            </a:r>
-          </a:p>
-          <a:p>
-            <a:r>
-              <a:rPr lang="en-US" dirty="0"/>
-              <a:t>And the histograms show that our data follows the normal distribution.</a:t>
-            </a:r>
-          </a:p>
-          <a:p>
-            <a:endParaRPr lang="en-US" dirty="0"/>
-          </a:p>
-          <a:p>
-            <a:r>
-              <a:rPr lang="en-US" dirty="0"/>
-              <a:t>For checking the </a:t>
-            </a:r>
-            <a:r>
-              <a:rPr lang="en-US" sz="1200" dirty="0"/>
-              <a:t>Linearity among the variables, and homogeneity of variance we will go to the next slides.</a:t>
+              <a:t>Now my three </a:t>
+            </a:r>
+            <a:r>
+              <a:rPr lang="en-US" sz="1200" dirty="0">
+                <a:latin typeface="Calibri" panose="020F0502020204030204" pitchFamily="34" charset="0"/>
+                <a:cs typeface="Calibri" panose="020F0502020204030204" pitchFamily="34" charset="0"/>
+              </a:rPr>
+              <a:t>data frames are ready to be cleaned.</a:t>
+            </a:r>
+          </a:p>
+          <a:p>
+            <a:endParaRPr lang="en-US" sz="1200" dirty="0">
+              <a:latin typeface="Calibri" panose="020F0502020204030204" pitchFamily="34" charset="0"/>
+              <a:cs typeface="Calibri" panose="020F0502020204030204" pitchFamily="34" charset="0"/>
+            </a:endParaRPr>
+          </a:p>
+          <a:p>
+            <a:r>
+              <a:rPr lang="en-US" sz="1200" dirty="0">
+                <a:latin typeface="Calibri" panose="020F0502020204030204" pitchFamily="34" charset="0"/>
+                <a:cs typeface="Calibri" panose="020F0502020204030204" pitchFamily="34" charset="0"/>
+              </a:rPr>
+              <a:t>For that I performed the following data cleaning steps.</a:t>
+            </a:r>
+          </a:p>
+          <a:p>
+            <a:endParaRPr lang="en-US" sz="1200" dirty="0">
+              <a:latin typeface="Calibri" panose="020F0502020204030204" pitchFamily="34" charset="0"/>
+              <a:cs typeface="Calibri" panose="020F0502020204030204" pitchFamily="34" charset="0"/>
+            </a:endParaRPr>
+          </a:p>
+          <a:p>
+            <a:r>
+              <a:rPr lang="en-US" sz="1200" dirty="0">
+                <a:latin typeface="Calibri" panose="020F0502020204030204" pitchFamily="34" charset="0"/>
+                <a:cs typeface="Calibri" panose="020F0502020204030204" pitchFamily="34" charset="0"/>
+              </a:rPr>
+              <a:t>Then exported the three CSV files to the working directory for designing the relational database.</a:t>
+            </a:r>
+          </a:p>
+          <a:p>
+            <a:endParaRPr lang="en-US" sz="1200" dirty="0">
+              <a:latin typeface="Calibri" panose="020F0502020204030204" pitchFamily="34" charset="0"/>
+              <a:cs typeface="Calibri" panose="020F0502020204030204" pitchFamily="34" charset="0"/>
+            </a:endParaRPr>
+          </a:p>
+          <a:p>
+            <a:r>
+              <a:rPr lang="en-US" sz="1200" dirty="0">
+                <a:latin typeface="Calibri" panose="020F0502020204030204" pitchFamily="34" charset="0"/>
+                <a:cs typeface="Calibri" panose="020F0502020204030204" pitchFamily="34" charset="0"/>
+              </a:rPr>
+              <a:t>And finally, after merging the three dataframes into new dataframe it is ready to apply linear regression model to investigate the impact of per capita income on education.</a:t>
             </a:r>
             <a:endParaRPr lang="en-US" dirty="0"/>
           </a:p>
@@ -4688,7 +5105,7 @@
           <a:p>
             <a:fld id="{D91607CE-69B0-4DE6-9B29-18F59D9E0C5E}" type="slidenum">
               <a:rPr lang="en-US" smtClean="0"/>
-              <a:t>8</a:t>
+              <a:t>6</a:t>
             </a:fld>
             <a:endParaRPr lang="en-US"/>
           </a:p>
@@ -4697,7 +5114,7 @@
     </p:spTree>
     <p:extLst>
       <p:ext uri="{BB962C8B-B14F-4D97-AF65-F5344CB8AC3E}">
-        <p14:creationId xmlns:p14="http://schemas.microsoft.com/office/powerpoint/2010/main" val="1609308609"/>
+        <p14:creationId xmlns:p14="http://schemas.microsoft.com/office/powerpoint/2010/main" val="1906942562"/>
       </p:ext>
     </p:extLst>
   </p:cSld>
@@ -4753,16 +5170,13 @@
           <a:p>
             <a:r>
               <a:rPr lang="en-US" dirty="0"/>
-              <a:t>3. The relationship between the independent and dependent variable must be linear. We can test this visually with a scatter plot to see if the distribution of data points could be described with a straight line.</a:t>
-            </a:r>
-          </a:p>
-          <a:p>
-            <a:endParaRPr lang="en-US" dirty="0"/>
+              <a:t>Here is the relational database design that I performed using the Quick DBD tool.</a:t>
+            </a:r>
           </a:p>
           <a:p>
             <a:r>
               <a:rPr lang="en-US" dirty="0"/>
-              <a:t>This scatter plot is showing a pretty linear relationship between x and y variables.</a:t>
+              <a:t>And the CSVs are ready to be imported into PostgreSQL database.</a:t>
             </a:r>
           </a:p>
         </p:txBody>
@@ -4784,7 +5198,7 @@
           <a:p>
             <a:fld id="{D91607CE-69B0-4DE6-9B29-18F59D9E0C5E}" type="slidenum">
               <a:rPr lang="en-US" smtClean="0"/>
-              <a:t>9</a:t>
+              <a:t>7</a:t>
             </a:fld>
             <a:endParaRPr lang="en-US"/>
           </a:p>
@@ -4793,7 +5207,7 @@
     </p:spTree>
     <p:extLst>
       <p:ext uri="{BB962C8B-B14F-4D97-AF65-F5344CB8AC3E}">
-        <p14:creationId xmlns:p14="http://schemas.microsoft.com/office/powerpoint/2010/main" val="2783689236"/>
+        <p14:creationId xmlns:p14="http://schemas.microsoft.com/office/powerpoint/2010/main" val="3034812331"/>
       </p:ext>
     </p:extLst>
   </p:cSld>
@@ -4847,76 +5261,58 @@
           <a:bodyPr/>
           <a:lstStyle/>
           <a:p>
-            <a:pPr marL="0" marR="0" lvl="0" indent="0" algn="l" defTabSz="914400" rtl="0" eaLnBrk="1" fontAlgn="auto" latinLnBrk="0" hangingPunct="1">
-              <a:lnSpc>
-                <a:spcPct val="100000"/>
-              </a:lnSpc>
-              <a:spcBef>
-                <a:spcPts val="0"/>
-              </a:spcBef>
-              <a:spcAft>
-                <a:spcPts val="0"/>
-              </a:spcAft>
-              <a:buClrTx/>
-              <a:buSzTx/>
-              <a:buFontTx/>
-              <a:buNone/>
-              <a:tabLst/>
-              <a:defRPr/>
+            <a:r>
+              <a:rPr lang="en-US" dirty="0"/>
+              <a:t>But before applying the linear regression model, the following four assumption must be made and visualize the data based on these assumption.</a:t>
+            </a:r>
+          </a:p>
+          <a:p>
+            <a:endParaRPr lang="en-US" dirty="0"/>
+          </a:p>
+          <a:p>
+            <a:pPr marL="228600" indent="-228600">
+              <a:buAutoNum type="arabicPeriod"/>
             </a:pPr>
             <a:r>
+              <a:rPr lang="en-US" sz="1200" dirty="0"/>
+              <a:t>For the Independence of observations : </a:t>
+            </a:r>
+            <a:r>
               <a:rPr lang="en-US" dirty="0"/>
-              <a:t>4. And a series of visualization is plotted to check the </a:t>
+              <a:t>Since I am interested only in one independent variable and one dependent variable, we don’t need to test for any hidden relationships among variables.</a:t>
+            </a:r>
+          </a:p>
+          <a:p>
+            <a:pPr marL="228600" indent="-228600">
+              <a:buAutoNum type="arabicPeriod"/>
+            </a:pPr>
+            <a:endParaRPr lang="en-US" dirty="0"/>
+          </a:p>
+          <a:p>
+            <a:r>
+              <a:rPr lang="en-US" dirty="0"/>
+              <a:t>2. The normality can be checked by using the hist() function, which tells whether the dependent variable follows a normal distribution or not.</a:t>
+            </a:r>
+          </a:p>
+          <a:p>
+            <a:r>
+              <a:rPr lang="en-US" dirty="0"/>
+              <a:t>And the histograms here shows that our data follows a normal distribution.</a:t>
+            </a:r>
+          </a:p>
+          <a:p>
+            <a:endParaRPr lang="en-US" dirty="0"/>
+          </a:p>
+          <a:p>
+            <a:r>
+              <a:rPr lang="en-US" dirty="0"/>
+              <a:t>For checking the </a:t>
             </a:r>
             <a:r>
               <a:rPr lang="en-US" sz="1200" dirty="0"/>
-              <a:t>homogeneity of variance. </a:t>
+              <a:t>Linearity among the variables, and homogeneity of variance we will go to the next slides.</a:t>
             </a:r>
             <a:endParaRPr lang="en-US" dirty="0"/>
-          </a:p>
-          <a:p>
-            <a:endParaRPr lang="en-US" dirty="0"/>
-          </a:p>
-          <a:p>
-            <a:r>
-              <a:rPr lang="en-US" dirty="0"/>
-              <a:t>The red lines representing the mean of the residuals are all basically horizontal and centered around zero. This means there are no outliers or biases in the data that would make a linear regression invalid.</a:t>
-            </a:r>
-          </a:p>
-          <a:p>
-            <a:endParaRPr lang="en-US" dirty="0"/>
-          </a:p>
-          <a:p>
-            <a:r>
-              <a:rPr lang="en-US" dirty="0"/>
-              <a:t>In the Normal Q-</a:t>
-            </a:r>
-            <a:r>
-              <a:rPr lang="en-US" dirty="0" err="1"/>
-              <a:t>Qplot</a:t>
-            </a:r>
-            <a:r>
-              <a:rPr lang="en-US" dirty="0"/>
-              <a:t> in the top right, we can see that the real residuals from our model form an almost perfectly one-to-one line with the theoretical residuals from a perfect model.</a:t>
-            </a:r>
-          </a:p>
-          <a:p>
-            <a:endParaRPr lang="en-US" dirty="0"/>
-          </a:p>
-          <a:p>
-            <a:r>
-              <a:rPr lang="en-US" dirty="0"/>
-              <a:t>Based on these residuals, we can say that our model meets the assumption of homoscedasticity.</a:t>
-            </a:r>
-          </a:p>
-          <a:p>
-            <a:endParaRPr lang="en-US" dirty="0"/>
-          </a:p>
-          <a:p>
-            <a:r>
-              <a:rPr lang="en-US" dirty="0"/>
-              <a:t>and the appropriate visualizations helps us better understand the data.</a:t>
-            </a:r>
           </a:p>
         </p:txBody>
       </p:sp>
@@ -4937,7 +5333,7 @@
           <a:p>
             <a:fld id="{D91607CE-69B0-4DE6-9B29-18F59D9E0C5E}" type="slidenum">
               <a:rPr lang="en-US" smtClean="0"/>
-              <a:t>10</a:t>
+              <a:t>8</a:t>
             </a:fld>
             <a:endParaRPr lang="en-US"/>
           </a:p>
@@ -4946,7 +5342,7 @@
     </p:spTree>
     <p:extLst>
       <p:ext uri="{BB962C8B-B14F-4D97-AF65-F5344CB8AC3E}">
-        <p14:creationId xmlns:p14="http://schemas.microsoft.com/office/powerpoint/2010/main" val="3944038424"/>
+        <p14:creationId xmlns:p14="http://schemas.microsoft.com/office/powerpoint/2010/main" val="1609308609"/>
       </p:ext>
     </p:extLst>
   </p:cSld>
@@ -5002,115 +5398,16 @@
           <a:p>
             <a:r>
               <a:rPr lang="en-US" dirty="0"/>
-              <a:t>Interpretation:</a:t>
-            </a:r>
-          </a:p>
-          <a:p>
-            <a:endParaRPr lang="en-US" dirty="0"/>
-          </a:p>
-          <a:p>
+              <a:t>3. According to the assumption the relationship between the percent of adults </a:t>
+            </a:r>
+            <a:r>
+              <a:rPr lang="en-US"/>
+              <a:t>with a bachelors' </a:t>
+            </a:r>
             <a:r>
               <a:rPr lang="en-US" dirty="0"/>
-              <a:t>A large F-statistic will correspond to a statistically significant p-value (p &lt; 0.05). In our example, the F-statistic equal 62.7 producing a p-value: 5.83e-13, which is highly significant. This means that, the predictor variables is significantly related to the outcome variable.</a:t>
-            </a:r>
-          </a:p>
-          <a:p>
-            <a:endParaRPr lang="en-US" dirty="0"/>
-          </a:p>
-          <a:p>
-            <a:r>
-              <a:rPr lang="en-US" dirty="0">
-                <a:solidFill>
-                  <a:srgbClr val="0070C0"/>
-                </a:solidFill>
-              </a:rPr>
-              <a:t>Our Null hypothesis (H0) : The model with no predictor variables fits the data, as well, as the regression model.</a:t>
-            </a:r>
-          </a:p>
-          <a:p>
-            <a:endParaRPr lang="en-US" dirty="0">
-              <a:solidFill>
-                <a:srgbClr val="0070C0"/>
-              </a:solidFill>
-            </a:endParaRPr>
-          </a:p>
-          <a:p>
-            <a:pPr marL="0" marR="0" lvl="0" indent="0" algn="l" defTabSz="914400" rtl="0" eaLnBrk="1" fontAlgn="auto" latinLnBrk="0" hangingPunct="1">
-              <a:lnSpc>
-                <a:spcPct val="100000"/>
-              </a:lnSpc>
-              <a:spcBef>
-                <a:spcPts val="0"/>
-              </a:spcBef>
-              <a:spcAft>
-                <a:spcPts val="0"/>
-              </a:spcAft>
-              <a:buClrTx/>
-              <a:buSzTx/>
-              <a:buFontTx/>
-              <a:buNone/>
-              <a:tabLst/>
-              <a:defRPr/>
-            </a:pPr>
-            <a:r>
-              <a:rPr lang="en-US" dirty="0">
-                <a:solidFill>
-                  <a:srgbClr val="0070C0"/>
-                </a:solidFill>
-              </a:rPr>
-              <a:t>Alternative hypothesis (HA) : Regression model fits the data better than the intercept-only model.</a:t>
-            </a:r>
-          </a:p>
-          <a:p>
-            <a:endParaRPr lang="en-US" dirty="0"/>
-          </a:p>
-          <a:p>
-            <a:endParaRPr lang="en-US" dirty="0"/>
-          </a:p>
-          <a:p>
-            <a:r>
-              <a:rPr lang="en-US" dirty="0"/>
-              <a:t>And we accept the alternate hypothesis that our regression model fits the data better than the intercept-only model.</a:t>
-            </a:r>
-          </a:p>
-          <a:p>
-            <a:endParaRPr lang="en-US" dirty="0"/>
-          </a:p>
-          <a:p>
-            <a:r>
-              <a:rPr lang="en-US" dirty="0"/>
-              <a:t>For a given predictor, the t-statistic evaluates whether there is significant association between the predictor and the outcome variable, that is whether the beta coefficient of the predictor is significantly different from zero.</a:t>
-            </a:r>
-          </a:p>
-          <a:p>
-            <a:endParaRPr lang="en-US" dirty="0"/>
-          </a:p>
-          <a:p>
-            <a:r>
-              <a:rPr lang="en-US" dirty="0"/>
-              <a:t>we can see, changing the per_capita_income variable is significantly associated to changes in percent_of_adults_with_a_bachelor_degree_or_higher_2015_19 </a:t>
-            </a:r>
-          </a:p>
-          <a:p>
-            <a:endParaRPr lang="en-US" dirty="0"/>
-          </a:p>
-          <a:p>
-            <a:r>
-              <a:rPr lang="en-US" dirty="0"/>
-              <a:t>For a given predictor variable, the coefficient (b) can be interpreted as the average effect on y of a one unit increase in predictor, holding all other predictors fixed.</a:t>
-            </a:r>
-          </a:p>
-          <a:p>
-            <a:endParaRPr lang="en-US" dirty="0"/>
-          </a:p>
-          <a:p>
-            <a:r>
-              <a:rPr lang="en-US" dirty="0"/>
-              <a:t>One unit increase in per_capita_income will significantly increase percent_of_adults_with_a_bachelor_degree_or_higher_2015_19, holding all other predictors fixed.</a:t>
-            </a:r>
-          </a:p>
-          <a:p>
-            <a:endParaRPr lang="en-US" dirty="0"/>
+              <a:t>degree and higher and per capita Income must be linear. We can check this visually with a scatter plot that the distribution of data points could be described with a straight line.</a:t>
+            </a:r>
           </a:p>
           <a:p>
             <a:endParaRPr lang="en-US" dirty="0"/>
@@ -5134,7 +5431,7 @@
           <a:p>
             <a:fld id="{D91607CE-69B0-4DE6-9B29-18F59D9E0C5E}" type="slidenum">
               <a:rPr lang="en-US" smtClean="0"/>
-              <a:t>11</a:t>
+              <a:t>9</a:t>
             </a:fld>
             <a:endParaRPr lang="en-US"/>
           </a:p>
@@ -5143,7 +5440,7 @@
     </p:spTree>
     <p:extLst>
       <p:ext uri="{BB962C8B-B14F-4D97-AF65-F5344CB8AC3E}">
-        <p14:creationId xmlns:p14="http://schemas.microsoft.com/office/powerpoint/2010/main" val="1215152824"/>
+        <p14:creationId xmlns:p14="http://schemas.microsoft.com/office/powerpoint/2010/main" val="2783689236"/>
       </p:ext>
     </p:extLst>
   </p:cSld>
@@ -5304,7 +5601,7 @@
           <a:p>
             <a:fld id="{2F3E8B1C-86EF-43CF-8304-249481088644}" type="datetimeFigureOut">
               <a:rPr lang="en-US" smtClean="0"/>
-              <a:t>5/16/2022</a:t>
+              <a:t>5/17/2022</a:t>
             </a:fld>
             <a:endParaRPr lang="en-US"/>
           </a:p>
@@ -5502,7 +5799,7 @@
           <a:p>
             <a:fld id="{2F3E8B1C-86EF-43CF-8304-249481088644}" type="datetimeFigureOut">
               <a:rPr lang="en-US" smtClean="0"/>
-              <a:t>5/16/2022</a:t>
+              <a:t>5/17/2022</a:t>
             </a:fld>
             <a:endParaRPr lang="en-US"/>
           </a:p>
@@ -5710,7 +6007,7 @@
           <a:p>
             <a:fld id="{2F3E8B1C-86EF-43CF-8304-249481088644}" type="datetimeFigureOut">
               <a:rPr lang="en-US" smtClean="0"/>
-              <a:t>5/16/2022</a:t>
+              <a:t>5/17/2022</a:t>
             </a:fld>
             <a:endParaRPr lang="en-US"/>
           </a:p>
@@ -5908,7 +6205,7 @@
           <a:p>
             <a:fld id="{2F3E8B1C-86EF-43CF-8304-249481088644}" type="datetimeFigureOut">
               <a:rPr lang="en-US" smtClean="0"/>
-              <a:t>5/16/2022</a:t>
+              <a:t>5/17/2022</a:t>
             </a:fld>
             <a:endParaRPr lang="en-US"/>
           </a:p>
@@ -6183,7 +6480,7 @@
           <a:p>
             <a:fld id="{2F3E8B1C-86EF-43CF-8304-249481088644}" type="datetimeFigureOut">
               <a:rPr lang="en-US" smtClean="0"/>
-              <a:t>5/16/2022</a:t>
+              <a:t>5/17/2022</a:t>
             </a:fld>
             <a:endParaRPr lang="en-US"/>
           </a:p>
@@ -6453,7 +6750,7 @@
           <a:p>
             <a:fld id="{2F3E8B1C-86EF-43CF-8304-249481088644}" type="datetimeFigureOut">
               <a:rPr lang="en-US" smtClean="0"/>
-              <a:t>5/16/2022</a:t>
+              <a:t>5/17/2022</a:t>
             </a:fld>
             <a:endParaRPr lang="en-US"/>
           </a:p>
@@ -6873,7 +7170,7 @@
           <a:p>
             <a:fld id="{2F3E8B1C-86EF-43CF-8304-249481088644}" type="datetimeFigureOut">
               <a:rPr lang="en-US" smtClean="0"/>
-              <a:t>5/16/2022</a:t>
+              <a:t>5/17/2022</a:t>
             </a:fld>
             <a:endParaRPr lang="en-US"/>
           </a:p>
@@ -7014,7 +7311,7 @@
           <a:p>
             <a:fld id="{2F3E8B1C-86EF-43CF-8304-249481088644}" type="datetimeFigureOut">
               <a:rPr lang="en-US" smtClean="0"/>
-              <a:t>5/16/2022</a:t>
+              <a:t>5/17/2022</a:t>
             </a:fld>
             <a:endParaRPr lang="en-US"/>
           </a:p>
@@ -7127,7 +7424,7 @@
           <a:p>
             <a:fld id="{2F3E8B1C-86EF-43CF-8304-249481088644}" type="datetimeFigureOut">
               <a:rPr lang="en-US" smtClean="0"/>
-              <a:t>5/16/2022</a:t>
+              <a:t>5/17/2022</a:t>
             </a:fld>
             <a:endParaRPr lang="en-US"/>
           </a:p>
@@ -7438,7 +7735,7 @@
           <a:p>
             <a:fld id="{2F3E8B1C-86EF-43CF-8304-249481088644}" type="datetimeFigureOut">
               <a:rPr lang="en-US" smtClean="0"/>
-              <a:t>5/16/2022</a:t>
+              <a:t>5/17/2022</a:t>
             </a:fld>
             <a:endParaRPr lang="en-US"/>
           </a:p>
@@ -7726,7 +8023,7 @@
           <a:p>
             <a:fld id="{2F3E8B1C-86EF-43CF-8304-249481088644}" type="datetimeFigureOut">
               <a:rPr lang="en-US" smtClean="0"/>
-              <a:t>5/16/2022</a:t>
+              <a:t>5/17/2022</a:t>
             </a:fld>
             <a:endParaRPr lang="en-US"/>
           </a:p>
@@ -7967,7 +8264,7 @@
             <a:fld id="{2F3E8B1C-86EF-43CF-8304-249481088644}" type="datetimeFigureOut">
               <a:rPr lang="en-US" smtClean="0"/>
               <a:pPr/>
-              <a:t>5/16/2022</a:t>
+              <a:t>5/17/2022</a:t>
             </a:fld>
             <a:endParaRPr lang="en-US" dirty="0"/>
           </a:p>
@@ -8752,13 +9049,13 @@
           <p:nvPr/>
         </p:nvPicPr>
         <p:blipFill rotWithShape="1">
-          <a:blip r:embed="rId2">
+          <a:blip r:embed="rId3">
             <a:extLst>
               <a:ext uri="{28A0092B-C50C-407E-A947-70E740481C1C}">
                 <a14:useLocalDpi xmlns:a14="http://schemas.microsoft.com/office/drawing/2010/main" val="0"/>
               </a:ext>
               <a:ext uri="{837473B0-CC2E-450A-ABE3-18F120FF3D39}">
-                <a1611:picAttrSrcUrl xmlns:a1611="http://schemas.microsoft.com/office/drawing/2016/11/main" r:id="rId3"/>
+                <a1611:picAttrSrcUrl xmlns:a1611="http://schemas.microsoft.com/office/drawing/2016/11/main" r:id="rId4"/>
               </a:ext>
             </a:extLst>
           </a:blip>
@@ -8815,7 +9112,7 @@
                 <a:solidFill>
                   <a:srgbClr val="FFFFFF"/>
                 </a:solidFill>
-                <a:hlinkClick r:id="rId3" tooltip="https://freepngimg.com/png/63583-visualization-data-illustration-png-image-high-quality">
+                <a:hlinkClick r:id="rId4" tooltip="https://freepngimg.com/png/63583-visualization-data-illustration-png-image-high-quality">
                   <a:extLst>
                     <a:ext uri="{A12FA001-AC4F-418D-AE19-62706E023703}">
                       <ahyp:hlinkClr xmlns:ahyp="http://schemas.microsoft.com/office/drawing/2018/hyperlinkcolor" val="tx"/>
@@ -8838,7 +9135,7 @@
                 <a:solidFill>
                   <a:srgbClr val="FFFFFF"/>
                 </a:solidFill>
-                <a:hlinkClick r:id="rId4" tooltip="https://creativecommons.org/licenses/by-nc/3.0/">
+                <a:hlinkClick r:id="rId5" tooltip="https://creativecommons.org/licenses/by-nc/3.0/">
                   <a:extLst>
                     <a:ext uri="{A12FA001-AC4F-418D-AE19-62706E023703}">
                       <ahyp:hlinkClr xmlns:ahyp="http://schemas.microsoft.com/office/drawing/2018/hyperlinkcolor" val="tx"/>
@@ -9593,7 +9890,7 @@
                 </a:solidFill>
                 <a:latin typeface="Calibri" panose="020F0502020204030204" pitchFamily="34" charset="0"/>
                 <a:cs typeface="Calibri" panose="020F0502020204030204" pitchFamily="34" charset="0"/>
-                <a:hlinkClick r:id="rId2">
+                <a:hlinkClick r:id="rId3">
                   <a:extLst>
                     <a:ext uri="{A12FA001-AC4F-418D-AE19-62706E023703}">
                       <ahyp:hlinkClr xmlns:ahyp="http://schemas.microsoft.com/office/drawing/2018/hyperlinkcolor" val="tx"/>
@@ -11777,10 +12074,10 @@
       </p:sp>
       <p:pic>
         <p:nvPicPr>
-          <p:cNvPr id="6" name="Picture 5">
+          <p:cNvPr id="4" name="Picture 3">
             <a:extLst>
               <a:ext uri="{FF2B5EF4-FFF2-40B4-BE49-F238E27FC236}">
-                <a16:creationId xmlns:a16="http://schemas.microsoft.com/office/drawing/2014/main" id="{879A68FC-02C6-0DD9-15A3-2020844EE712}"/>
+                <a16:creationId xmlns:a16="http://schemas.microsoft.com/office/drawing/2014/main" id="{1342BF77-AD61-FEAB-AB08-16B7BDAD9C2E}"/>
               </a:ext>
             </a:extLst>
           </p:cNvPr>
@@ -11797,8 +12094,8 @@
         </p:blipFill>
         <p:spPr>
           <a:xfrm>
-            <a:off x="2899300" y="1929279"/>
-            <a:ext cx="6666667" cy="4006625"/>
+            <a:off x="2712933" y="1821618"/>
+            <a:ext cx="6666667" cy="4114286"/>
           </a:xfrm>
           <a:prstGeom prst="rect">
             <a:avLst/>

</xml_diff>

<commit_message>
footnotes are added in the slides
</commit_message>
<xml_diff>
--- a/Analysis of Education and Socioeconomic Status.pptx
+++ b/Analysis of Education and Socioeconomic Status.pptx
@@ -3146,7 +3146,7 @@
           <a:p>
             <a:fld id="{4FD92C36-925F-4835-9C0F-AF6483863590}" type="datetimeFigureOut">
               <a:rPr lang="en-US" smtClean="0"/>
-              <a:t>5/17/2022</a:t>
+              <a:t>5/18/2022</a:t>
             </a:fld>
             <a:endParaRPr lang="en-US"/>
           </a:p>
@@ -3835,7 +3835,7 @@
           <a:p>
             <a:r>
               <a:rPr lang="en-US" dirty="0"/>
-              <a:t>And we accept the alternate hypothesis that our regression model fits the data better than the intercept-only model.</a:t>
+              <a:t>And I accept the alternate hypothesis that our regression model fits the data better than the intercept-only model.</a:t>
             </a:r>
           </a:p>
           <a:p>
@@ -4565,7 +4565,7 @@
                 <a:effectLst/>
                 <a:latin typeface="Roboto" panose="02000000000000000000" pitchFamily="2" charset="0"/>
               </a:rPr>
-              <a:t>made scraping of the data from web pages possible.</a:t>
+              <a:t>made the scraping of the data from web pages possible.</a:t>
             </a:r>
           </a:p>
           <a:p>
@@ -5052,7 +5052,7 @@
                 <a:latin typeface="Calibri" panose="020F0502020204030204" pitchFamily="34" charset="0"/>
                 <a:cs typeface="Calibri" panose="020F0502020204030204" pitchFamily="34" charset="0"/>
               </a:rPr>
-              <a:t>For that I performed the following data cleaning steps.</a:t>
+              <a:t>For that I performed the following mentioned data cleaning steps.</a:t>
             </a:r>
           </a:p>
           <a:p>
@@ -5176,7 +5176,7 @@
           <a:p>
             <a:r>
               <a:rPr lang="en-US" dirty="0"/>
-              <a:t>And the CSVs are ready to be imported into PostgreSQL database.</a:t>
+              <a:t>And from here the CSVs are ready to be imported into PostgreSQL database.</a:t>
             </a:r>
           </a:p>
         </p:txBody>
@@ -5263,7 +5263,7 @@
           <a:p>
             <a:r>
               <a:rPr lang="en-US" dirty="0"/>
-              <a:t>But before applying the linear regression model, the following four assumption must be made and visualize the data based on these assumption.</a:t>
+              <a:t>But before applying the linear regression model, the following four assumption must be made, and data must be visualized based on these assumption.</a:t>
             </a:r>
           </a:p>
           <a:p>
@@ -5601,7 +5601,7 @@
           <a:p>
             <a:fld id="{2F3E8B1C-86EF-43CF-8304-249481088644}" type="datetimeFigureOut">
               <a:rPr lang="en-US" smtClean="0"/>
-              <a:t>5/17/2022</a:t>
+              <a:t>5/18/2022</a:t>
             </a:fld>
             <a:endParaRPr lang="en-US"/>
           </a:p>
@@ -5799,7 +5799,7 @@
           <a:p>
             <a:fld id="{2F3E8B1C-86EF-43CF-8304-249481088644}" type="datetimeFigureOut">
               <a:rPr lang="en-US" smtClean="0"/>
-              <a:t>5/17/2022</a:t>
+              <a:t>5/18/2022</a:t>
             </a:fld>
             <a:endParaRPr lang="en-US"/>
           </a:p>
@@ -6007,7 +6007,7 @@
           <a:p>
             <a:fld id="{2F3E8B1C-86EF-43CF-8304-249481088644}" type="datetimeFigureOut">
               <a:rPr lang="en-US" smtClean="0"/>
-              <a:t>5/17/2022</a:t>
+              <a:t>5/18/2022</a:t>
             </a:fld>
             <a:endParaRPr lang="en-US"/>
           </a:p>
@@ -6205,7 +6205,7 @@
           <a:p>
             <a:fld id="{2F3E8B1C-86EF-43CF-8304-249481088644}" type="datetimeFigureOut">
               <a:rPr lang="en-US" smtClean="0"/>
-              <a:t>5/17/2022</a:t>
+              <a:t>5/18/2022</a:t>
             </a:fld>
             <a:endParaRPr lang="en-US"/>
           </a:p>
@@ -6480,7 +6480,7 @@
           <a:p>
             <a:fld id="{2F3E8B1C-86EF-43CF-8304-249481088644}" type="datetimeFigureOut">
               <a:rPr lang="en-US" smtClean="0"/>
-              <a:t>5/17/2022</a:t>
+              <a:t>5/18/2022</a:t>
             </a:fld>
             <a:endParaRPr lang="en-US"/>
           </a:p>
@@ -6750,7 +6750,7 @@
           <a:p>
             <a:fld id="{2F3E8B1C-86EF-43CF-8304-249481088644}" type="datetimeFigureOut">
               <a:rPr lang="en-US" smtClean="0"/>
-              <a:t>5/17/2022</a:t>
+              <a:t>5/18/2022</a:t>
             </a:fld>
             <a:endParaRPr lang="en-US"/>
           </a:p>
@@ -7170,7 +7170,7 @@
           <a:p>
             <a:fld id="{2F3E8B1C-86EF-43CF-8304-249481088644}" type="datetimeFigureOut">
               <a:rPr lang="en-US" smtClean="0"/>
-              <a:t>5/17/2022</a:t>
+              <a:t>5/18/2022</a:t>
             </a:fld>
             <a:endParaRPr lang="en-US"/>
           </a:p>
@@ -7311,7 +7311,7 @@
           <a:p>
             <a:fld id="{2F3E8B1C-86EF-43CF-8304-249481088644}" type="datetimeFigureOut">
               <a:rPr lang="en-US" smtClean="0"/>
-              <a:t>5/17/2022</a:t>
+              <a:t>5/18/2022</a:t>
             </a:fld>
             <a:endParaRPr lang="en-US"/>
           </a:p>
@@ -7424,7 +7424,7 @@
           <a:p>
             <a:fld id="{2F3E8B1C-86EF-43CF-8304-249481088644}" type="datetimeFigureOut">
               <a:rPr lang="en-US" smtClean="0"/>
-              <a:t>5/17/2022</a:t>
+              <a:t>5/18/2022</a:t>
             </a:fld>
             <a:endParaRPr lang="en-US"/>
           </a:p>
@@ -7735,7 +7735,7 @@
           <a:p>
             <a:fld id="{2F3E8B1C-86EF-43CF-8304-249481088644}" type="datetimeFigureOut">
               <a:rPr lang="en-US" smtClean="0"/>
-              <a:t>5/17/2022</a:t>
+              <a:t>5/18/2022</a:t>
             </a:fld>
             <a:endParaRPr lang="en-US"/>
           </a:p>
@@ -8023,7 +8023,7 @@
           <a:p>
             <a:fld id="{2F3E8B1C-86EF-43CF-8304-249481088644}" type="datetimeFigureOut">
               <a:rPr lang="en-US" smtClean="0"/>
-              <a:t>5/17/2022</a:t>
+              <a:t>5/18/2022</a:t>
             </a:fld>
             <a:endParaRPr lang="en-US"/>
           </a:p>
@@ -8264,7 +8264,7 @@
             <a:fld id="{2F3E8B1C-86EF-43CF-8304-249481088644}" type="datetimeFigureOut">
               <a:rPr lang="en-US" smtClean="0"/>
               <a:pPr/>
-              <a:t>5/17/2022</a:t>
+              <a:t>5/18/2022</a:t>
             </a:fld>
             <a:endParaRPr lang="en-US" dirty="0"/>
           </a:p>

</xml_diff>